<commit_message>
added plots for species example, minor changes to figure captions in supplement
</commit_message>
<xml_diff>
--- a/Workflow.pptx
+++ b/Workflow.pptx
@@ -2,12 +2,14 @@
 <file path=ppt/presentation.xml><?xml version="1.0" encoding="utf-8"?>
 <p:presentation xmlns:a="http://schemas.openxmlformats.org/drawingml/2006/main" xmlns:r="http://schemas.openxmlformats.org/officeDocument/2006/relationships" xmlns:p="http://schemas.openxmlformats.org/presentationml/2006/main" saveSubsetFonts="1">
   <p:sldMasterIdLst>
-    <p:sldMasterId id="2147483660" r:id="rId1"/>
+    <p:sldMasterId id="2147483672" r:id="rId1"/>
   </p:sldMasterIdLst>
   <p:sldIdLst>
     <p:sldId id="257" r:id="rId2"/>
+    <p:sldId id="258" r:id="rId3"/>
+    <p:sldId id="259" r:id="rId4"/>
   </p:sldIdLst>
-  <p:sldSz cx="6858000" cy="9906000" type="A4"/>
+  <p:sldSz cx="12801600" cy="9601200" type="A3"/>
   <p:notesSz cx="6858000" cy="9144000"/>
   <p:defaultTextStyle>
     <a:defPPr>
@@ -104,6 +106,11 @@
       </a:defRPr>
     </a:lvl9pPr>
   </p:defaultTextStyle>
+  <p:extLst>
+    <p:ext uri="{EFAFB233-063F-42B5-8137-9DF3F51BA10A}">
+      <p15:sldGuideLst xmlns:p15="http://schemas.microsoft.com/office/powerpoint/2012/main"/>
+    </p:ext>
+  </p:extLst>
 </p:presentation>
 </file>
 
@@ -136,15 +143,15 @@
         </p:nvSpPr>
         <p:spPr>
           <a:xfrm>
-            <a:off x="514350" y="1621191"/>
-            <a:ext cx="5829300" cy="3448756"/>
+            <a:off x="960120" y="1571308"/>
+            <a:ext cx="10881360" cy="3342640"/>
           </a:xfrm>
         </p:spPr>
         <p:txBody>
           <a:bodyPr anchor="b"/>
           <a:lstStyle>
             <a:lvl1pPr algn="ctr">
-              <a:defRPr sz="4500"/>
+              <a:defRPr sz="8400"/>
             </a:lvl1pPr>
           </a:lstStyle>
           <a:p>
@@ -168,8 +175,8 @@
         </p:nvSpPr>
         <p:spPr>
           <a:xfrm>
-            <a:off x="857250" y="5202944"/>
-            <a:ext cx="5143500" cy="2391656"/>
+            <a:off x="1600200" y="5042853"/>
+            <a:ext cx="9601200" cy="2318067"/>
           </a:xfrm>
         </p:spPr>
         <p:txBody>
@@ -177,39 +184,39 @@
           <a:lstStyle>
             <a:lvl1pPr marL="0" indent="0" algn="ctr">
               <a:buNone/>
-              <a:defRPr sz="1800"/>
+              <a:defRPr sz="3360"/>
             </a:lvl1pPr>
-            <a:lvl2pPr marL="342900" indent="0" algn="ctr">
-              <a:buNone/>
-              <a:defRPr sz="1500"/>
+            <a:lvl2pPr marL="640080" indent="0" algn="ctr">
+              <a:buNone/>
+              <a:defRPr sz="2800"/>
             </a:lvl2pPr>
-            <a:lvl3pPr marL="685800" indent="0" algn="ctr">
-              <a:buNone/>
-              <a:defRPr sz="1350"/>
+            <a:lvl3pPr marL="1280160" indent="0" algn="ctr">
+              <a:buNone/>
+              <a:defRPr sz="2520"/>
             </a:lvl3pPr>
-            <a:lvl4pPr marL="1028700" indent="0" algn="ctr">
-              <a:buNone/>
-              <a:defRPr sz="1200"/>
+            <a:lvl4pPr marL="1920240" indent="0" algn="ctr">
+              <a:buNone/>
+              <a:defRPr sz="2240"/>
             </a:lvl4pPr>
-            <a:lvl5pPr marL="1371600" indent="0" algn="ctr">
-              <a:buNone/>
-              <a:defRPr sz="1200"/>
+            <a:lvl5pPr marL="2560320" indent="0" algn="ctr">
+              <a:buNone/>
+              <a:defRPr sz="2240"/>
             </a:lvl5pPr>
-            <a:lvl6pPr marL="1714500" indent="0" algn="ctr">
-              <a:buNone/>
-              <a:defRPr sz="1200"/>
+            <a:lvl6pPr marL="3200400" indent="0" algn="ctr">
+              <a:buNone/>
+              <a:defRPr sz="2240"/>
             </a:lvl6pPr>
-            <a:lvl7pPr marL="2057400" indent="0" algn="ctr">
-              <a:buNone/>
-              <a:defRPr sz="1200"/>
+            <a:lvl7pPr marL="3840480" indent="0" algn="ctr">
+              <a:buNone/>
+              <a:defRPr sz="2240"/>
             </a:lvl7pPr>
-            <a:lvl8pPr marL="2400300" indent="0" algn="ctr">
-              <a:buNone/>
-              <a:defRPr sz="1200"/>
+            <a:lvl8pPr marL="4480560" indent="0" algn="ctr">
+              <a:buNone/>
+              <a:defRPr sz="2240"/>
             </a:lvl8pPr>
-            <a:lvl9pPr marL="2743200" indent="0" algn="ctr">
-              <a:buNone/>
-              <a:defRPr sz="1200"/>
+            <a:lvl9pPr marL="5120640" indent="0" algn="ctr">
+              <a:buNone/>
+              <a:defRPr sz="2240"/>
             </a:lvl9pPr>
           </a:lstStyle>
           <a:p>
@@ -238,7 +245,7 @@
           <a:p>
             <a:fld id="{7B1FDBB2-CFF6-41ED-8C63-CF8DE01FC2E7}" type="datetimeFigureOut">
               <a:rPr lang="en-GB" smtClean="0"/>
-              <a:t>13/11/2024</a:t>
+              <a:t>03/04/2025</a:t>
             </a:fld>
             <a:endParaRPr lang="en-GB"/>
           </a:p>
@@ -289,7 +296,7 @@
     </p:spTree>
     <p:extLst>
       <p:ext uri="{BB962C8B-B14F-4D97-AF65-F5344CB8AC3E}">
-        <p14:creationId xmlns:p14="http://schemas.microsoft.com/office/powerpoint/2010/main" val="1042953438"/>
+        <p14:creationId xmlns:p14="http://schemas.microsoft.com/office/powerpoint/2010/main" val="2599011457"/>
       </p:ext>
     </p:extLst>
   </p:cSld>
@@ -408,7 +415,7 @@
           <a:p>
             <a:fld id="{7B1FDBB2-CFF6-41ED-8C63-CF8DE01FC2E7}" type="datetimeFigureOut">
               <a:rPr lang="en-GB" smtClean="0"/>
-              <a:t>13/11/2024</a:t>
+              <a:t>03/04/2025</a:t>
             </a:fld>
             <a:endParaRPr lang="en-GB"/>
           </a:p>
@@ -459,7 +466,7 @@
     </p:spTree>
     <p:extLst>
       <p:ext uri="{BB962C8B-B14F-4D97-AF65-F5344CB8AC3E}">
-        <p14:creationId xmlns:p14="http://schemas.microsoft.com/office/powerpoint/2010/main" val="2255746366"/>
+        <p14:creationId xmlns:p14="http://schemas.microsoft.com/office/powerpoint/2010/main" val="2345942750"/>
       </p:ext>
     </p:extLst>
   </p:cSld>
@@ -498,8 +505,8 @@
         </p:nvSpPr>
         <p:spPr>
           <a:xfrm>
-            <a:off x="4907757" y="527403"/>
-            <a:ext cx="1478756" cy="8394877"/>
+            <a:off x="9161146" y="511175"/>
+            <a:ext cx="2760345" cy="8136573"/>
           </a:xfrm>
         </p:spPr>
         <p:txBody>
@@ -526,8 +533,8 @@
         </p:nvSpPr>
         <p:spPr>
           <a:xfrm>
-            <a:off x="471488" y="527403"/>
-            <a:ext cx="4350544" cy="8394877"/>
+            <a:off x="880111" y="511175"/>
+            <a:ext cx="8121015" cy="8136573"/>
           </a:xfrm>
         </p:spPr>
         <p:txBody>
@@ -588,7 +595,7 @@
           <a:p>
             <a:fld id="{7B1FDBB2-CFF6-41ED-8C63-CF8DE01FC2E7}" type="datetimeFigureOut">
               <a:rPr lang="en-GB" smtClean="0"/>
-              <a:t>13/11/2024</a:t>
+              <a:t>03/04/2025</a:t>
             </a:fld>
             <a:endParaRPr lang="en-GB"/>
           </a:p>
@@ -639,7 +646,7 @@
     </p:spTree>
     <p:extLst>
       <p:ext uri="{BB962C8B-B14F-4D97-AF65-F5344CB8AC3E}">
-        <p14:creationId xmlns:p14="http://schemas.microsoft.com/office/powerpoint/2010/main" val="4029534101"/>
+        <p14:creationId xmlns:p14="http://schemas.microsoft.com/office/powerpoint/2010/main" val="140704171"/>
       </p:ext>
     </p:extLst>
   </p:cSld>
@@ -758,7 +765,7 @@
           <a:p>
             <a:fld id="{7B1FDBB2-CFF6-41ED-8C63-CF8DE01FC2E7}" type="datetimeFigureOut">
               <a:rPr lang="en-GB" smtClean="0"/>
-              <a:t>13/11/2024</a:t>
+              <a:t>03/04/2025</a:t>
             </a:fld>
             <a:endParaRPr lang="en-GB"/>
           </a:p>
@@ -809,7 +816,7 @@
     </p:spTree>
     <p:extLst>
       <p:ext uri="{BB962C8B-B14F-4D97-AF65-F5344CB8AC3E}">
-        <p14:creationId xmlns:p14="http://schemas.microsoft.com/office/powerpoint/2010/main" val="1087308055"/>
+        <p14:creationId xmlns:p14="http://schemas.microsoft.com/office/powerpoint/2010/main" val="981454518"/>
       </p:ext>
     </p:extLst>
   </p:cSld>
@@ -848,15 +855,15 @@
         </p:nvSpPr>
         <p:spPr>
           <a:xfrm>
-            <a:off x="467916" y="2469624"/>
-            <a:ext cx="5915025" cy="4120620"/>
+            <a:off x="873443" y="2393635"/>
+            <a:ext cx="11041380" cy="3993832"/>
           </a:xfrm>
         </p:spPr>
         <p:txBody>
           <a:bodyPr anchor="b"/>
           <a:lstStyle>
             <a:lvl1pPr>
-              <a:defRPr sz="4500"/>
+              <a:defRPr sz="8400"/>
             </a:lvl1pPr>
           </a:lstStyle>
           <a:p>
@@ -880,8 +887,8 @@
         </p:nvSpPr>
         <p:spPr>
           <a:xfrm>
-            <a:off x="467916" y="6629226"/>
-            <a:ext cx="5915025" cy="2166937"/>
+            <a:off x="873443" y="6425250"/>
+            <a:ext cx="11041380" cy="2100262"/>
           </a:xfrm>
         </p:spPr>
         <p:txBody>
@@ -889,15 +896,15 @@
           <a:lstStyle>
             <a:lvl1pPr marL="0" indent="0">
               <a:buNone/>
-              <a:defRPr sz="1800">
+              <a:defRPr sz="3360">
                 <a:solidFill>
                   <a:schemeClr val="tx1"/>
                 </a:solidFill>
               </a:defRPr>
             </a:lvl1pPr>
-            <a:lvl2pPr marL="342900" indent="0">
-              <a:buNone/>
-              <a:defRPr sz="1500">
+            <a:lvl2pPr marL="640080" indent="0">
+              <a:buNone/>
+              <a:defRPr sz="2800">
                 <a:solidFill>
                   <a:schemeClr val="tx1">
                     <a:tint val="75000"/>
@@ -905,9 +912,9 @@
                 </a:solidFill>
               </a:defRPr>
             </a:lvl2pPr>
-            <a:lvl3pPr marL="685800" indent="0">
-              <a:buNone/>
-              <a:defRPr sz="1350">
+            <a:lvl3pPr marL="1280160" indent="0">
+              <a:buNone/>
+              <a:defRPr sz="2520">
                 <a:solidFill>
                   <a:schemeClr val="tx1">
                     <a:tint val="75000"/>
@@ -915,9 +922,9 @@
                 </a:solidFill>
               </a:defRPr>
             </a:lvl3pPr>
-            <a:lvl4pPr marL="1028700" indent="0">
-              <a:buNone/>
-              <a:defRPr sz="1200">
+            <a:lvl4pPr marL="1920240" indent="0">
+              <a:buNone/>
+              <a:defRPr sz="2240">
                 <a:solidFill>
                   <a:schemeClr val="tx1">
                     <a:tint val="75000"/>
@@ -925,9 +932,9 @@
                 </a:solidFill>
               </a:defRPr>
             </a:lvl4pPr>
-            <a:lvl5pPr marL="1371600" indent="0">
-              <a:buNone/>
-              <a:defRPr sz="1200">
+            <a:lvl5pPr marL="2560320" indent="0">
+              <a:buNone/>
+              <a:defRPr sz="2240">
                 <a:solidFill>
                   <a:schemeClr val="tx1">
                     <a:tint val="75000"/>
@@ -935,9 +942,9 @@
                 </a:solidFill>
               </a:defRPr>
             </a:lvl5pPr>
-            <a:lvl6pPr marL="1714500" indent="0">
-              <a:buNone/>
-              <a:defRPr sz="1200">
+            <a:lvl6pPr marL="3200400" indent="0">
+              <a:buNone/>
+              <a:defRPr sz="2240">
                 <a:solidFill>
                   <a:schemeClr val="tx1">
                     <a:tint val="75000"/>
@@ -945,9 +952,9 @@
                 </a:solidFill>
               </a:defRPr>
             </a:lvl6pPr>
-            <a:lvl7pPr marL="2057400" indent="0">
-              <a:buNone/>
-              <a:defRPr sz="1200">
+            <a:lvl7pPr marL="3840480" indent="0">
+              <a:buNone/>
+              <a:defRPr sz="2240">
                 <a:solidFill>
                   <a:schemeClr val="tx1">
                     <a:tint val="75000"/>
@@ -955,9 +962,9 @@
                 </a:solidFill>
               </a:defRPr>
             </a:lvl7pPr>
-            <a:lvl8pPr marL="2400300" indent="0">
-              <a:buNone/>
-              <a:defRPr sz="1200">
+            <a:lvl8pPr marL="4480560" indent="0">
+              <a:buNone/>
+              <a:defRPr sz="2240">
                 <a:solidFill>
                   <a:schemeClr val="tx1">
                     <a:tint val="75000"/>
@@ -965,9 +972,9 @@
                 </a:solidFill>
               </a:defRPr>
             </a:lvl8pPr>
-            <a:lvl9pPr marL="2743200" indent="0">
-              <a:buNone/>
-              <a:defRPr sz="1200">
+            <a:lvl9pPr marL="5120640" indent="0">
+              <a:buNone/>
+              <a:defRPr sz="2240">
                 <a:solidFill>
                   <a:schemeClr val="tx1">
                     <a:tint val="75000"/>
@@ -1002,7 +1009,7 @@
           <a:p>
             <a:fld id="{7B1FDBB2-CFF6-41ED-8C63-CF8DE01FC2E7}" type="datetimeFigureOut">
               <a:rPr lang="en-GB" smtClean="0"/>
-              <a:t>13/11/2024</a:t>
+              <a:t>03/04/2025</a:t>
             </a:fld>
             <a:endParaRPr lang="en-GB"/>
           </a:p>
@@ -1053,7 +1060,7 @@
     </p:spTree>
     <p:extLst>
       <p:ext uri="{BB962C8B-B14F-4D97-AF65-F5344CB8AC3E}">
-        <p14:creationId xmlns:p14="http://schemas.microsoft.com/office/powerpoint/2010/main" val="4292703784"/>
+        <p14:creationId xmlns:p14="http://schemas.microsoft.com/office/powerpoint/2010/main" val="3232231656"/>
       </p:ext>
     </p:extLst>
   </p:cSld>
@@ -1115,8 +1122,8 @@
         </p:nvSpPr>
         <p:spPr>
           <a:xfrm>
-            <a:off x="471488" y="2637014"/>
-            <a:ext cx="2914650" cy="6285266"/>
+            <a:off x="880110" y="2555875"/>
+            <a:ext cx="5440680" cy="6091873"/>
           </a:xfrm>
         </p:spPr>
         <p:txBody>
@@ -1172,8 +1179,8 @@
         </p:nvSpPr>
         <p:spPr>
           <a:xfrm>
-            <a:off x="3471863" y="2637014"/>
-            <a:ext cx="2914650" cy="6285266"/>
+            <a:off x="6480810" y="2555875"/>
+            <a:ext cx="5440680" cy="6091873"/>
           </a:xfrm>
         </p:spPr>
         <p:txBody>
@@ -1234,7 +1241,7 @@
           <a:p>
             <a:fld id="{7B1FDBB2-CFF6-41ED-8C63-CF8DE01FC2E7}" type="datetimeFigureOut">
               <a:rPr lang="en-GB" smtClean="0"/>
-              <a:t>13/11/2024</a:t>
+              <a:t>03/04/2025</a:t>
             </a:fld>
             <a:endParaRPr lang="en-GB"/>
           </a:p>
@@ -1285,7 +1292,7 @@
     </p:spTree>
     <p:extLst>
       <p:ext uri="{BB962C8B-B14F-4D97-AF65-F5344CB8AC3E}">
-        <p14:creationId xmlns:p14="http://schemas.microsoft.com/office/powerpoint/2010/main" val="4103503623"/>
+        <p14:creationId xmlns:p14="http://schemas.microsoft.com/office/powerpoint/2010/main" val="247679097"/>
       </p:ext>
     </p:extLst>
   </p:cSld>
@@ -1324,8 +1331,8 @@
         </p:nvSpPr>
         <p:spPr>
           <a:xfrm>
-            <a:off x="472381" y="527405"/>
-            <a:ext cx="5915025" cy="1914702"/>
+            <a:off x="881777" y="511177"/>
+            <a:ext cx="11041380" cy="1855788"/>
           </a:xfrm>
         </p:spPr>
         <p:txBody>
@@ -1352,8 +1359,8 @@
         </p:nvSpPr>
         <p:spPr>
           <a:xfrm>
-            <a:off x="472381" y="2428347"/>
-            <a:ext cx="2901255" cy="1190095"/>
+            <a:off x="881779" y="2353628"/>
+            <a:ext cx="5415676" cy="1153477"/>
           </a:xfrm>
         </p:spPr>
         <p:txBody>
@@ -1361,39 +1368,39 @@
           <a:lstStyle>
             <a:lvl1pPr marL="0" indent="0">
               <a:buNone/>
-              <a:defRPr sz="1800" b="1"/>
+              <a:defRPr sz="3360" b="1"/>
             </a:lvl1pPr>
-            <a:lvl2pPr marL="342900" indent="0">
-              <a:buNone/>
-              <a:defRPr sz="1500" b="1"/>
+            <a:lvl2pPr marL="640080" indent="0">
+              <a:buNone/>
+              <a:defRPr sz="2800" b="1"/>
             </a:lvl2pPr>
-            <a:lvl3pPr marL="685800" indent="0">
-              <a:buNone/>
-              <a:defRPr sz="1350" b="1"/>
+            <a:lvl3pPr marL="1280160" indent="0">
+              <a:buNone/>
+              <a:defRPr sz="2520" b="1"/>
             </a:lvl3pPr>
-            <a:lvl4pPr marL="1028700" indent="0">
-              <a:buNone/>
-              <a:defRPr sz="1200" b="1"/>
+            <a:lvl4pPr marL="1920240" indent="0">
+              <a:buNone/>
+              <a:defRPr sz="2240" b="1"/>
             </a:lvl4pPr>
-            <a:lvl5pPr marL="1371600" indent="0">
-              <a:buNone/>
-              <a:defRPr sz="1200" b="1"/>
+            <a:lvl5pPr marL="2560320" indent="0">
+              <a:buNone/>
+              <a:defRPr sz="2240" b="1"/>
             </a:lvl5pPr>
-            <a:lvl6pPr marL="1714500" indent="0">
-              <a:buNone/>
-              <a:defRPr sz="1200" b="1"/>
+            <a:lvl6pPr marL="3200400" indent="0">
+              <a:buNone/>
+              <a:defRPr sz="2240" b="1"/>
             </a:lvl6pPr>
-            <a:lvl7pPr marL="2057400" indent="0">
-              <a:buNone/>
-              <a:defRPr sz="1200" b="1"/>
+            <a:lvl7pPr marL="3840480" indent="0">
+              <a:buNone/>
+              <a:defRPr sz="2240" b="1"/>
             </a:lvl7pPr>
-            <a:lvl8pPr marL="2400300" indent="0">
-              <a:buNone/>
-              <a:defRPr sz="1200" b="1"/>
+            <a:lvl8pPr marL="4480560" indent="0">
+              <a:buNone/>
+              <a:defRPr sz="2240" b="1"/>
             </a:lvl8pPr>
-            <a:lvl9pPr marL="2743200" indent="0">
-              <a:buNone/>
-              <a:defRPr sz="1200" b="1"/>
+            <a:lvl9pPr marL="5120640" indent="0">
+              <a:buNone/>
+              <a:defRPr sz="2240" b="1"/>
             </a:lvl9pPr>
           </a:lstStyle>
           <a:p>
@@ -1417,8 +1424,8 @@
         </p:nvSpPr>
         <p:spPr>
           <a:xfrm>
-            <a:off x="472381" y="3618442"/>
-            <a:ext cx="2901255" cy="5322183"/>
+            <a:off x="881779" y="3507105"/>
+            <a:ext cx="5415676" cy="5158423"/>
           </a:xfrm>
         </p:spPr>
         <p:txBody>
@@ -1474,8 +1481,8 @@
         </p:nvSpPr>
         <p:spPr>
           <a:xfrm>
-            <a:off x="3471863" y="2428347"/>
-            <a:ext cx="2915543" cy="1190095"/>
+            <a:off x="6480811" y="2353628"/>
+            <a:ext cx="5442347" cy="1153477"/>
           </a:xfrm>
         </p:spPr>
         <p:txBody>
@@ -1483,39 +1490,39 @@
           <a:lstStyle>
             <a:lvl1pPr marL="0" indent="0">
               <a:buNone/>
-              <a:defRPr sz="1800" b="1"/>
+              <a:defRPr sz="3360" b="1"/>
             </a:lvl1pPr>
-            <a:lvl2pPr marL="342900" indent="0">
-              <a:buNone/>
-              <a:defRPr sz="1500" b="1"/>
+            <a:lvl2pPr marL="640080" indent="0">
+              <a:buNone/>
+              <a:defRPr sz="2800" b="1"/>
             </a:lvl2pPr>
-            <a:lvl3pPr marL="685800" indent="0">
-              <a:buNone/>
-              <a:defRPr sz="1350" b="1"/>
+            <a:lvl3pPr marL="1280160" indent="0">
+              <a:buNone/>
+              <a:defRPr sz="2520" b="1"/>
             </a:lvl3pPr>
-            <a:lvl4pPr marL="1028700" indent="0">
-              <a:buNone/>
-              <a:defRPr sz="1200" b="1"/>
+            <a:lvl4pPr marL="1920240" indent="0">
+              <a:buNone/>
+              <a:defRPr sz="2240" b="1"/>
             </a:lvl4pPr>
-            <a:lvl5pPr marL="1371600" indent="0">
-              <a:buNone/>
-              <a:defRPr sz="1200" b="1"/>
+            <a:lvl5pPr marL="2560320" indent="0">
+              <a:buNone/>
+              <a:defRPr sz="2240" b="1"/>
             </a:lvl5pPr>
-            <a:lvl6pPr marL="1714500" indent="0">
-              <a:buNone/>
-              <a:defRPr sz="1200" b="1"/>
+            <a:lvl6pPr marL="3200400" indent="0">
+              <a:buNone/>
+              <a:defRPr sz="2240" b="1"/>
             </a:lvl6pPr>
-            <a:lvl7pPr marL="2057400" indent="0">
-              <a:buNone/>
-              <a:defRPr sz="1200" b="1"/>
+            <a:lvl7pPr marL="3840480" indent="0">
+              <a:buNone/>
+              <a:defRPr sz="2240" b="1"/>
             </a:lvl7pPr>
-            <a:lvl8pPr marL="2400300" indent="0">
-              <a:buNone/>
-              <a:defRPr sz="1200" b="1"/>
+            <a:lvl8pPr marL="4480560" indent="0">
+              <a:buNone/>
+              <a:defRPr sz="2240" b="1"/>
             </a:lvl8pPr>
-            <a:lvl9pPr marL="2743200" indent="0">
-              <a:buNone/>
-              <a:defRPr sz="1200" b="1"/>
+            <a:lvl9pPr marL="5120640" indent="0">
+              <a:buNone/>
+              <a:defRPr sz="2240" b="1"/>
             </a:lvl9pPr>
           </a:lstStyle>
           <a:p>
@@ -1539,8 +1546,8 @@
         </p:nvSpPr>
         <p:spPr>
           <a:xfrm>
-            <a:off x="3471863" y="3618442"/>
-            <a:ext cx="2915543" cy="5322183"/>
+            <a:off x="6480811" y="3507105"/>
+            <a:ext cx="5442347" cy="5158423"/>
           </a:xfrm>
         </p:spPr>
         <p:txBody>
@@ -1601,7 +1608,7 @@
           <a:p>
             <a:fld id="{7B1FDBB2-CFF6-41ED-8C63-CF8DE01FC2E7}" type="datetimeFigureOut">
               <a:rPr lang="en-GB" smtClean="0"/>
-              <a:t>13/11/2024</a:t>
+              <a:t>03/04/2025</a:t>
             </a:fld>
             <a:endParaRPr lang="en-GB"/>
           </a:p>
@@ -1652,7 +1659,7 @@
     </p:spTree>
     <p:extLst>
       <p:ext uri="{BB962C8B-B14F-4D97-AF65-F5344CB8AC3E}">
-        <p14:creationId xmlns:p14="http://schemas.microsoft.com/office/powerpoint/2010/main" val="2198238259"/>
+        <p14:creationId xmlns:p14="http://schemas.microsoft.com/office/powerpoint/2010/main" val="4195899769"/>
       </p:ext>
     </p:extLst>
   </p:cSld>
@@ -1719,7 +1726,7 @@
           <a:p>
             <a:fld id="{7B1FDBB2-CFF6-41ED-8C63-CF8DE01FC2E7}" type="datetimeFigureOut">
               <a:rPr lang="en-GB" smtClean="0"/>
-              <a:t>13/11/2024</a:t>
+              <a:t>03/04/2025</a:t>
             </a:fld>
             <a:endParaRPr lang="en-GB"/>
           </a:p>
@@ -1770,7 +1777,7 @@
     </p:spTree>
     <p:extLst>
       <p:ext uri="{BB962C8B-B14F-4D97-AF65-F5344CB8AC3E}">
-        <p14:creationId xmlns:p14="http://schemas.microsoft.com/office/powerpoint/2010/main" val="496958622"/>
+        <p14:creationId xmlns:p14="http://schemas.microsoft.com/office/powerpoint/2010/main" val="3367834889"/>
       </p:ext>
     </p:extLst>
   </p:cSld>
@@ -1814,7 +1821,7 @@
           <a:p>
             <a:fld id="{7B1FDBB2-CFF6-41ED-8C63-CF8DE01FC2E7}" type="datetimeFigureOut">
               <a:rPr lang="en-GB" smtClean="0"/>
-              <a:t>13/11/2024</a:t>
+              <a:t>03/04/2025</a:t>
             </a:fld>
             <a:endParaRPr lang="en-GB"/>
           </a:p>
@@ -1865,7 +1872,7 @@
     </p:spTree>
     <p:extLst>
       <p:ext uri="{BB962C8B-B14F-4D97-AF65-F5344CB8AC3E}">
-        <p14:creationId xmlns:p14="http://schemas.microsoft.com/office/powerpoint/2010/main" val="491840386"/>
+        <p14:creationId xmlns:p14="http://schemas.microsoft.com/office/powerpoint/2010/main" val="1107746492"/>
       </p:ext>
     </p:extLst>
   </p:cSld>
@@ -1904,15 +1911,15 @@
         </p:nvSpPr>
         <p:spPr>
           <a:xfrm>
-            <a:off x="472381" y="660400"/>
-            <a:ext cx="2211884" cy="2311400"/>
+            <a:off x="881778" y="640080"/>
+            <a:ext cx="4128849" cy="2240280"/>
           </a:xfrm>
         </p:spPr>
         <p:txBody>
           <a:bodyPr anchor="b"/>
           <a:lstStyle>
             <a:lvl1pPr>
-              <a:defRPr sz="2400"/>
+              <a:defRPr sz="4480"/>
             </a:lvl1pPr>
           </a:lstStyle>
           <a:p>
@@ -1936,39 +1943,39 @@
         </p:nvSpPr>
         <p:spPr>
           <a:xfrm>
-            <a:off x="2915543" y="1426283"/>
-            <a:ext cx="3471863" cy="7039681"/>
+            <a:off x="5442347" y="1382397"/>
+            <a:ext cx="6480810" cy="6823075"/>
           </a:xfrm>
         </p:spPr>
         <p:txBody>
           <a:bodyPr/>
           <a:lstStyle>
             <a:lvl1pPr>
-              <a:defRPr sz="2400"/>
+              <a:defRPr sz="4480"/>
             </a:lvl1pPr>
             <a:lvl2pPr>
-              <a:defRPr sz="2100"/>
+              <a:defRPr sz="3920"/>
             </a:lvl2pPr>
             <a:lvl3pPr>
-              <a:defRPr sz="1800"/>
+              <a:defRPr sz="3360"/>
             </a:lvl3pPr>
             <a:lvl4pPr>
-              <a:defRPr sz="1500"/>
+              <a:defRPr sz="2800"/>
             </a:lvl4pPr>
             <a:lvl5pPr>
-              <a:defRPr sz="1500"/>
+              <a:defRPr sz="2800"/>
             </a:lvl5pPr>
             <a:lvl6pPr>
-              <a:defRPr sz="1500"/>
+              <a:defRPr sz="2800"/>
             </a:lvl6pPr>
             <a:lvl7pPr>
-              <a:defRPr sz="1500"/>
+              <a:defRPr sz="2800"/>
             </a:lvl7pPr>
             <a:lvl8pPr>
-              <a:defRPr sz="1500"/>
+              <a:defRPr sz="2800"/>
             </a:lvl8pPr>
             <a:lvl9pPr>
-              <a:defRPr sz="1500"/>
+              <a:defRPr sz="2800"/>
             </a:lvl9pPr>
           </a:lstStyle>
           <a:p>
@@ -2021,8 +2028,8 @@
         </p:nvSpPr>
         <p:spPr>
           <a:xfrm>
-            <a:off x="472381" y="2971800"/>
-            <a:ext cx="2211884" cy="5505627"/>
+            <a:off x="881778" y="2880360"/>
+            <a:ext cx="4128849" cy="5336223"/>
           </a:xfrm>
         </p:spPr>
         <p:txBody>
@@ -2030,39 +2037,39 @@
           <a:lstStyle>
             <a:lvl1pPr marL="0" indent="0">
               <a:buNone/>
-              <a:defRPr sz="1200"/>
+              <a:defRPr sz="2240"/>
             </a:lvl1pPr>
-            <a:lvl2pPr marL="342900" indent="0">
-              <a:buNone/>
-              <a:defRPr sz="1050"/>
+            <a:lvl2pPr marL="640080" indent="0">
+              <a:buNone/>
+              <a:defRPr sz="1960"/>
             </a:lvl2pPr>
-            <a:lvl3pPr marL="685800" indent="0">
-              <a:buNone/>
-              <a:defRPr sz="900"/>
+            <a:lvl3pPr marL="1280160" indent="0">
+              <a:buNone/>
+              <a:defRPr sz="1680"/>
             </a:lvl3pPr>
-            <a:lvl4pPr marL="1028700" indent="0">
-              <a:buNone/>
-              <a:defRPr sz="750"/>
+            <a:lvl4pPr marL="1920240" indent="0">
+              <a:buNone/>
+              <a:defRPr sz="1400"/>
             </a:lvl4pPr>
-            <a:lvl5pPr marL="1371600" indent="0">
-              <a:buNone/>
-              <a:defRPr sz="750"/>
+            <a:lvl5pPr marL="2560320" indent="0">
+              <a:buNone/>
+              <a:defRPr sz="1400"/>
             </a:lvl5pPr>
-            <a:lvl6pPr marL="1714500" indent="0">
-              <a:buNone/>
-              <a:defRPr sz="750"/>
+            <a:lvl6pPr marL="3200400" indent="0">
+              <a:buNone/>
+              <a:defRPr sz="1400"/>
             </a:lvl6pPr>
-            <a:lvl7pPr marL="2057400" indent="0">
-              <a:buNone/>
-              <a:defRPr sz="750"/>
+            <a:lvl7pPr marL="3840480" indent="0">
+              <a:buNone/>
+              <a:defRPr sz="1400"/>
             </a:lvl7pPr>
-            <a:lvl8pPr marL="2400300" indent="0">
-              <a:buNone/>
-              <a:defRPr sz="750"/>
+            <a:lvl8pPr marL="4480560" indent="0">
+              <a:buNone/>
+              <a:defRPr sz="1400"/>
             </a:lvl8pPr>
-            <a:lvl9pPr marL="2743200" indent="0">
-              <a:buNone/>
-              <a:defRPr sz="750"/>
+            <a:lvl9pPr marL="5120640" indent="0">
+              <a:buNone/>
+              <a:defRPr sz="1400"/>
             </a:lvl9pPr>
           </a:lstStyle>
           <a:p>
@@ -2091,7 +2098,7 @@
           <a:p>
             <a:fld id="{7B1FDBB2-CFF6-41ED-8C63-CF8DE01FC2E7}" type="datetimeFigureOut">
               <a:rPr lang="en-GB" smtClean="0"/>
-              <a:t>13/11/2024</a:t>
+              <a:t>03/04/2025</a:t>
             </a:fld>
             <a:endParaRPr lang="en-GB"/>
           </a:p>
@@ -2142,7 +2149,7 @@
     </p:spTree>
     <p:extLst>
       <p:ext uri="{BB962C8B-B14F-4D97-AF65-F5344CB8AC3E}">
-        <p14:creationId xmlns:p14="http://schemas.microsoft.com/office/powerpoint/2010/main" val="3124398151"/>
+        <p14:creationId xmlns:p14="http://schemas.microsoft.com/office/powerpoint/2010/main" val="2797652343"/>
       </p:ext>
     </p:extLst>
   </p:cSld>
@@ -2181,15 +2188,15 @@
         </p:nvSpPr>
         <p:spPr>
           <a:xfrm>
-            <a:off x="472381" y="660400"/>
-            <a:ext cx="2211884" cy="2311400"/>
+            <a:off x="881778" y="640080"/>
+            <a:ext cx="4128849" cy="2240280"/>
           </a:xfrm>
         </p:spPr>
         <p:txBody>
           <a:bodyPr anchor="b"/>
           <a:lstStyle>
             <a:lvl1pPr>
-              <a:defRPr sz="2400"/>
+              <a:defRPr sz="4480"/>
             </a:lvl1pPr>
           </a:lstStyle>
           <a:p>
@@ -2213,8 +2220,8 @@
         </p:nvSpPr>
         <p:spPr>
           <a:xfrm>
-            <a:off x="2915543" y="1426283"/>
-            <a:ext cx="3471863" cy="7039681"/>
+            <a:off x="5442347" y="1382397"/>
+            <a:ext cx="6480810" cy="6823075"/>
           </a:xfrm>
         </p:spPr>
         <p:txBody>
@@ -2222,39 +2229,39 @@
           <a:lstStyle>
             <a:lvl1pPr marL="0" indent="0">
               <a:buNone/>
-              <a:defRPr sz="2400"/>
+              <a:defRPr sz="4480"/>
             </a:lvl1pPr>
-            <a:lvl2pPr marL="342900" indent="0">
-              <a:buNone/>
-              <a:defRPr sz="2100"/>
+            <a:lvl2pPr marL="640080" indent="0">
+              <a:buNone/>
+              <a:defRPr sz="3920"/>
             </a:lvl2pPr>
-            <a:lvl3pPr marL="685800" indent="0">
-              <a:buNone/>
-              <a:defRPr sz="1800"/>
+            <a:lvl3pPr marL="1280160" indent="0">
+              <a:buNone/>
+              <a:defRPr sz="3360"/>
             </a:lvl3pPr>
-            <a:lvl4pPr marL="1028700" indent="0">
-              <a:buNone/>
-              <a:defRPr sz="1500"/>
+            <a:lvl4pPr marL="1920240" indent="0">
+              <a:buNone/>
+              <a:defRPr sz="2800"/>
             </a:lvl4pPr>
-            <a:lvl5pPr marL="1371600" indent="0">
-              <a:buNone/>
-              <a:defRPr sz="1500"/>
+            <a:lvl5pPr marL="2560320" indent="0">
+              <a:buNone/>
+              <a:defRPr sz="2800"/>
             </a:lvl5pPr>
-            <a:lvl6pPr marL="1714500" indent="0">
-              <a:buNone/>
-              <a:defRPr sz="1500"/>
+            <a:lvl6pPr marL="3200400" indent="0">
+              <a:buNone/>
+              <a:defRPr sz="2800"/>
             </a:lvl6pPr>
-            <a:lvl7pPr marL="2057400" indent="0">
-              <a:buNone/>
-              <a:defRPr sz="1500"/>
+            <a:lvl7pPr marL="3840480" indent="0">
+              <a:buNone/>
+              <a:defRPr sz="2800"/>
             </a:lvl7pPr>
-            <a:lvl8pPr marL="2400300" indent="0">
-              <a:buNone/>
-              <a:defRPr sz="1500"/>
+            <a:lvl8pPr marL="4480560" indent="0">
+              <a:buNone/>
+              <a:defRPr sz="2800"/>
             </a:lvl8pPr>
-            <a:lvl9pPr marL="2743200" indent="0">
-              <a:buNone/>
-              <a:defRPr sz="1500"/>
+            <a:lvl9pPr marL="5120640" indent="0">
+              <a:buNone/>
+              <a:defRPr sz="2800"/>
             </a:lvl9pPr>
           </a:lstStyle>
           <a:p>
@@ -2278,8 +2285,8 @@
         </p:nvSpPr>
         <p:spPr>
           <a:xfrm>
-            <a:off x="472381" y="2971800"/>
-            <a:ext cx="2211884" cy="5505627"/>
+            <a:off x="881778" y="2880360"/>
+            <a:ext cx="4128849" cy="5336223"/>
           </a:xfrm>
         </p:spPr>
         <p:txBody>
@@ -2287,39 +2294,39 @@
           <a:lstStyle>
             <a:lvl1pPr marL="0" indent="0">
               <a:buNone/>
-              <a:defRPr sz="1200"/>
+              <a:defRPr sz="2240"/>
             </a:lvl1pPr>
-            <a:lvl2pPr marL="342900" indent="0">
-              <a:buNone/>
-              <a:defRPr sz="1050"/>
+            <a:lvl2pPr marL="640080" indent="0">
+              <a:buNone/>
+              <a:defRPr sz="1960"/>
             </a:lvl2pPr>
-            <a:lvl3pPr marL="685800" indent="0">
-              <a:buNone/>
-              <a:defRPr sz="900"/>
+            <a:lvl3pPr marL="1280160" indent="0">
+              <a:buNone/>
+              <a:defRPr sz="1680"/>
             </a:lvl3pPr>
-            <a:lvl4pPr marL="1028700" indent="0">
-              <a:buNone/>
-              <a:defRPr sz="750"/>
+            <a:lvl4pPr marL="1920240" indent="0">
+              <a:buNone/>
+              <a:defRPr sz="1400"/>
             </a:lvl4pPr>
-            <a:lvl5pPr marL="1371600" indent="0">
-              <a:buNone/>
-              <a:defRPr sz="750"/>
+            <a:lvl5pPr marL="2560320" indent="0">
+              <a:buNone/>
+              <a:defRPr sz="1400"/>
             </a:lvl5pPr>
-            <a:lvl6pPr marL="1714500" indent="0">
-              <a:buNone/>
-              <a:defRPr sz="750"/>
+            <a:lvl6pPr marL="3200400" indent="0">
+              <a:buNone/>
+              <a:defRPr sz="1400"/>
             </a:lvl6pPr>
-            <a:lvl7pPr marL="2057400" indent="0">
-              <a:buNone/>
-              <a:defRPr sz="750"/>
+            <a:lvl7pPr marL="3840480" indent="0">
+              <a:buNone/>
+              <a:defRPr sz="1400"/>
             </a:lvl7pPr>
-            <a:lvl8pPr marL="2400300" indent="0">
-              <a:buNone/>
-              <a:defRPr sz="750"/>
+            <a:lvl8pPr marL="4480560" indent="0">
+              <a:buNone/>
+              <a:defRPr sz="1400"/>
             </a:lvl8pPr>
-            <a:lvl9pPr marL="2743200" indent="0">
-              <a:buNone/>
-              <a:defRPr sz="750"/>
+            <a:lvl9pPr marL="5120640" indent="0">
+              <a:buNone/>
+              <a:defRPr sz="1400"/>
             </a:lvl9pPr>
           </a:lstStyle>
           <a:p>
@@ -2348,7 +2355,7 @@
           <a:p>
             <a:fld id="{7B1FDBB2-CFF6-41ED-8C63-CF8DE01FC2E7}" type="datetimeFigureOut">
               <a:rPr lang="en-GB" smtClean="0"/>
-              <a:t>13/11/2024</a:t>
+              <a:t>03/04/2025</a:t>
             </a:fld>
             <a:endParaRPr lang="en-GB"/>
           </a:p>
@@ -2399,7 +2406,7 @@
     </p:spTree>
     <p:extLst>
       <p:ext uri="{BB962C8B-B14F-4D97-AF65-F5344CB8AC3E}">
-        <p14:creationId xmlns:p14="http://schemas.microsoft.com/office/powerpoint/2010/main" val="21609671"/>
+        <p14:creationId xmlns:p14="http://schemas.microsoft.com/office/powerpoint/2010/main" val="2568205902"/>
       </p:ext>
     </p:extLst>
   </p:cSld>
@@ -2443,8 +2450,8 @@
         </p:nvSpPr>
         <p:spPr>
           <a:xfrm>
-            <a:off x="471488" y="527405"/>
-            <a:ext cx="5915025" cy="1914702"/>
+            <a:off x="880110" y="511177"/>
+            <a:ext cx="11041380" cy="1855788"/>
           </a:xfrm>
           <a:prstGeom prst="rect">
             <a:avLst/>
@@ -2476,8 +2483,8 @@
         </p:nvSpPr>
         <p:spPr>
           <a:xfrm>
-            <a:off x="471488" y="2637014"/>
-            <a:ext cx="5915025" cy="6285266"/>
+            <a:off x="880110" y="2555875"/>
+            <a:ext cx="11041380" cy="6091873"/>
           </a:xfrm>
           <a:prstGeom prst="rect">
             <a:avLst/>
@@ -2538,8 +2545,8 @@
         </p:nvSpPr>
         <p:spPr>
           <a:xfrm>
-            <a:off x="471488" y="9181397"/>
-            <a:ext cx="1543050" cy="527403"/>
+            <a:off x="880110" y="8898892"/>
+            <a:ext cx="2880360" cy="511175"/>
           </a:xfrm>
           <a:prstGeom prst="rect">
             <a:avLst/>
@@ -2549,7 +2556,7 @@
           <a:bodyPr vert="horz" lIns="91440" tIns="45720" rIns="91440" bIns="45720" rtlCol="0" anchor="ctr"/>
           <a:lstStyle>
             <a:lvl1pPr algn="l">
-              <a:defRPr sz="900">
+              <a:defRPr sz="1680">
                 <a:solidFill>
                   <a:schemeClr val="tx1">
                     <a:tint val="75000"/>
@@ -2561,7 +2568,7 @@
           <a:p>
             <a:fld id="{7B1FDBB2-CFF6-41ED-8C63-CF8DE01FC2E7}" type="datetimeFigureOut">
               <a:rPr lang="en-GB" smtClean="0"/>
-              <a:t>13/11/2024</a:t>
+              <a:t>03/04/2025</a:t>
             </a:fld>
             <a:endParaRPr lang="en-GB"/>
           </a:p>
@@ -2579,8 +2586,8 @@
         </p:nvSpPr>
         <p:spPr>
           <a:xfrm>
-            <a:off x="2271713" y="9181397"/>
-            <a:ext cx="2314575" cy="527403"/>
+            <a:off x="4240530" y="8898892"/>
+            <a:ext cx="4320540" cy="511175"/>
           </a:xfrm>
           <a:prstGeom prst="rect">
             <a:avLst/>
@@ -2590,7 +2597,7 @@
           <a:bodyPr vert="horz" lIns="91440" tIns="45720" rIns="91440" bIns="45720" rtlCol="0" anchor="ctr"/>
           <a:lstStyle>
             <a:lvl1pPr algn="ctr">
-              <a:defRPr sz="900">
+              <a:defRPr sz="1680">
                 <a:solidFill>
                   <a:schemeClr val="tx1">
                     <a:tint val="75000"/>
@@ -2616,8 +2623,8 @@
         </p:nvSpPr>
         <p:spPr>
           <a:xfrm>
-            <a:off x="4843463" y="9181397"/>
-            <a:ext cx="1543050" cy="527403"/>
+            <a:off x="9041130" y="8898892"/>
+            <a:ext cx="2880360" cy="511175"/>
           </a:xfrm>
           <a:prstGeom prst="rect">
             <a:avLst/>
@@ -2627,7 +2634,7 @@
           <a:bodyPr vert="horz" lIns="91440" tIns="45720" rIns="91440" bIns="45720" rtlCol="0" anchor="ctr"/>
           <a:lstStyle>
             <a:lvl1pPr algn="r">
-              <a:defRPr sz="900">
+              <a:defRPr sz="1680">
                 <a:solidFill>
                   <a:schemeClr val="tx1">
                     <a:tint val="75000"/>
@@ -2648,27 +2655,27 @@
     </p:spTree>
     <p:extLst>
       <p:ext uri="{BB962C8B-B14F-4D97-AF65-F5344CB8AC3E}">
-        <p14:creationId xmlns:p14="http://schemas.microsoft.com/office/powerpoint/2010/main" val="3936590620"/>
+        <p14:creationId xmlns:p14="http://schemas.microsoft.com/office/powerpoint/2010/main" val="3917144070"/>
       </p:ext>
     </p:extLst>
   </p:cSld>
   <p:clrMap bg1="lt1" tx1="dk1" bg2="lt2" tx2="dk2" accent1="accent1" accent2="accent2" accent3="accent3" accent4="accent4" accent5="accent5" accent6="accent6" hlink="hlink" folHlink="folHlink"/>
   <p:sldLayoutIdLst>
-    <p:sldLayoutId id="2147483661" r:id="rId1"/>
-    <p:sldLayoutId id="2147483662" r:id="rId2"/>
-    <p:sldLayoutId id="2147483663" r:id="rId3"/>
-    <p:sldLayoutId id="2147483664" r:id="rId4"/>
-    <p:sldLayoutId id="2147483665" r:id="rId5"/>
-    <p:sldLayoutId id="2147483666" r:id="rId6"/>
-    <p:sldLayoutId id="2147483667" r:id="rId7"/>
-    <p:sldLayoutId id="2147483668" r:id="rId8"/>
-    <p:sldLayoutId id="2147483669" r:id="rId9"/>
-    <p:sldLayoutId id="2147483670" r:id="rId10"/>
-    <p:sldLayoutId id="2147483671" r:id="rId11"/>
+    <p:sldLayoutId id="2147483673" r:id="rId1"/>
+    <p:sldLayoutId id="2147483674" r:id="rId2"/>
+    <p:sldLayoutId id="2147483675" r:id="rId3"/>
+    <p:sldLayoutId id="2147483676" r:id="rId4"/>
+    <p:sldLayoutId id="2147483677" r:id="rId5"/>
+    <p:sldLayoutId id="2147483678" r:id="rId6"/>
+    <p:sldLayoutId id="2147483679" r:id="rId7"/>
+    <p:sldLayoutId id="2147483680" r:id="rId8"/>
+    <p:sldLayoutId id="2147483681" r:id="rId9"/>
+    <p:sldLayoutId id="2147483682" r:id="rId10"/>
+    <p:sldLayoutId id="2147483683" r:id="rId11"/>
   </p:sldLayoutIdLst>
   <p:txStyles>
     <p:titleStyle>
-      <a:lvl1pPr algn="l" defTabSz="685800" rtl="0" eaLnBrk="1" latinLnBrk="0" hangingPunct="1">
+      <a:lvl1pPr algn="l" defTabSz="1280160" rtl="0" eaLnBrk="1" latinLnBrk="0" hangingPunct="1">
         <a:lnSpc>
           <a:spcPct val="90000"/>
         </a:lnSpc>
@@ -2676,7 +2683,7 @@
           <a:spcPct val="0"/>
         </a:spcBef>
         <a:buNone/>
-        <a:defRPr sz="3300" kern="1200">
+        <a:defRPr sz="6160" kern="1200">
           <a:solidFill>
             <a:schemeClr val="tx1"/>
           </a:solidFill>
@@ -2687,16 +2694,16 @@
       </a:lvl1pPr>
     </p:titleStyle>
     <p:bodyStyle>
-      <a:lvl1pPr marL="171450" indent="-171450" algn="l" defTabSz="685800" rtl="0" eaLnBrk="1" latinLnBrk="0" hangingPunct="1">
+      <a:lvl1pPr marL="320040" indent="-320040" algn="l" defTabSz="1280160" rtl="0" eaLnBrk="1" latinLnBrk="0" hangingPunct="1">
         <a:lnSpc>
           <a:spcPct val="90000"/>
         </a:lnSpc>
         <a:spcBef>
-          <a:spcPts val="750"/>
+          <a:spcPts val="1400"/>
         </a:spcBef>
         <a:buFont typeface="Arial" panose="020B0604020202020204" pitchFamily="34" charset="0"/>
         <a:buChar char="•"/>
-        <a:defRPr sz="2100" kern="1200">
+        <a:defRPr sz="3920" kern="1200">
           <a:solidFill>
             <a:schemeClr val="tx1"/>
           </a:solidFill>
@@ -2705,16 +2712,16 @@
           <a:cs typeface="+mn-cs"/>
         </a:defRPr>
       </a:lvl1pPr>
-      <a:lvl2pPr marL="514350" indent="-171450" algn="l" defTabSz="685800" rtl="0" eaLnBrk="1" latinLnBrk="0" hangingPunct="1">
+      <a:lvl2pPr marL="960120" indent="-320040" algn="l" defTabSz="1280160" rtl="0" eaLnBrk="1" latinLnBrk="0" hangingPunct="1">
         <a:lnSpc>
           <a:spcPct val="90000"/>
         </a:lnSpc>
         <a:spcBef>
-          <a:spcPts val="375"/>
+          <a:spcPts val="700"/>
         </a:spcBef>
         <a:buFont typeface="Arial" panose="020B0604020202020204" pitchFamily="34" charset="0"/>
         <a:buChar char="•"/>
-        <a:defRPr sz="1800" kern="1200">
+        <a:defRPr sz="3360" kern="1200">
           <a:solidFill>
             <a:schemeClr val="tx1"/>
           </a:solidFill>
@@ -2723,16 +2730,16 @@
           <a:cs typeface="+mn-cs"/>
         </a:defRPr>
       </a:lvl2pPr>
-      <a:lvl3pPr marL="857250" indent="-171450" algn="l" defTabSz="685800" rtl="0" eaLnBrk="1" latinLnBrk="0" hangingPunct="1">
+      <a:lvl3pPr marL="1600200" indent="-320040" algn="l" defTabSz="1280160" rtl="0" eaLnBrk="1" latinLnBrk="0" hangingPunct="1">
         <a:lnSpc>
           <a:spcPct val="90000"/>
         </a:lnSpc>
         <a:spcBef>
-          <a:spcPts val="375"/>
+          <a:spcPts val="700"/>
         </a:spcBef>
         <a:buFont typeface="Arial" panose="020B0604020202020204" pitchFamily="34" charset="0"/>
         <a:buChar char="•"/>
-        <a:defRPr sz="1500" kern="1200">
+        <a:defRPr sz="2800" kern="1200">
           <a:solidFill>
             <a:schemeClr val="tx1"/>
           </a:solidFill>
@@ -2741,16 +2748,16 @@
           <a:cs typeface="+mn-cs"/>
         </a:defRPr>
       </a:lvl3pPr>
-      <a:lvl4pPr marL="1200150" indent="-171450" algn="l" defTabSz="685800" rtl="0" eaLnBrk="1" latinLnBrk="0" hangingPunct="1">
+      <a:lvl4pPr marL="2240280" indent="-320040" algn="l" defTabSz="1280160" rtl="0" eaLnBrk="1" latinLnBrk="0" hangingPunct="1">
         <a:lnSpc>
           <a:spcPct val="90000"/>
         </a:lnSpc>
         <a:spcBef>
-          <a:spcPts val="375"/>
+          <a:spcPts val="700"/>
         </a:spcBef>
         <a:buFont typeface="Arial" panose="020B0604020202020204" pitchFamily="34" charset="0"/>
         <a:buChar char="•"/>
-        <a:defRPr sz="1350" kern="1200">
+        <a:defRPr sz="2520" kern="1200">
           <a:solidFill>
             <a:schemeClr val="tx1"/>
           </a:solidFill>
@@ -2759,16 +2766,16 @@
           <a:cs typeface="+mn-cs"/>
         </a:defRPr>
       </a:lvl4pPr>
-      <a:lvl5pPr marL="1543050" indent="-171450" algn="l" defTabSz="685800" rtl="0" eaLnBrk="1" latinLnBrk="0" hangingPunct="1">
+      <a:lvl5pPr marL="2880360" indent="-320040" algn="l" defTabSz="1280160" rtl="0" eaLnBrk="1" latinLnBrk="0" hangingPunct="1">
         <a:lnSpc>
           <a:spcPct val="90000"/>
         </a:lnSpc>
         <a:spcBef>
-          <a:spcPts val="375"/>
+          <a:spcPts val="700"/>
         </a:spcBef>
         <a:buFont typeface="Arial" panose="020B0604020202020204" pitchFamily="34" charset="0"/>
         <a:buChar char="•"/>
-        <a:defRPr sz="1350" kern="1200">
+        <a:defRPr sz="2520" kern="1200">
           <a:solidFill>
             <a:schemeClr val="tx1"/>
           </a:solidFill>
@@ -2777,16 +2784,16 @@
           <a:cs typeface="+mn-cs"/>
         </a:defRPr>
       </a:lvl5pPr>
-      <a:lvl6pPr marL="1885950" indent="-171450" algn="l" defTabSz="685800" rtl="0" eaLnBrk="1" latinLnBrk="0" hangingPunct="1">
+      <a:lvl6pPr marL="3520440" indent="-320040" algn="l" defTabSz="1280160" rtl="0" eaLnBrk="1" latinLnBrk="0" hangingPunct="1">
         <a:lnSpc>
           <a:spcPct val="90000"/>
         </a:lnSpc>
         <a:spcBef>
-          <a:spcPts val="375"/>
+          <a:spcPts val="700"/>
         </a:spcBef>
         <a:buFont typeface="Arial" panose="020B0604020202020204" pitchFamily="34" charset="0"/>
         <a:buChar char="•"/>
-        <a:defRPr sz="1350" kern="1200">
+        <a:defRPr sz="2520" kern="1200">
           <a:solidFill>
             <a:schemeClr val="tx1"/>
           </a:solidFill>
@@ -2795,16 +2802,16 @@
           <a:cs typeface="+mn-cs"/>
         </a:defRPr>
       </a:lvl6pPr>
-      <a:lvl7pPr marL="2228850" indent="-171450" algn="l" defTabSz="685800" rtl="0" eaLnBrk="1" latinLnBrk="0" hangingPunct="1">
+      <a:lvl7pPr marL="4160520" indent="-320040" algn="l" defTabSz="1280160" rtl="0" eaLnBrk="1" latinLnBrk="0" hangingPunct="1">
         <a:lnSpc>
           <a:spcPct val="90000"/>
         </a:lnSpc>
         <a:spcBef>
-          <a:spcPts val="375"/>
+          <a:spcPts val="700"/>
         </a:spcBef>
         <a:buFont typeface="Arial" panose="020B0604020202020204" pitchFamily="34" charset="0"/>
         <a:buChar char="•"/>
-        <a:defRPr sz="1350" kern="1200">
+        <a:defRPr sz="2520" kern="1200">
           <a:solidFill>
             <a:schemeClr val="tx1"/>
           </a:solidFill>
@@ -2813,16 +2820,16 @@
           <a:cs typeface="+mn-cs"/>
         </a:defRPr>
       </a:lvl7pPr>
-      <a:lvl8pPr marL="2571750" indent="-171450" algn="l" defTabSz="685800" rtl="0" eaLnBrk="1" latinLnBrk="0" hangingPunct="1">
+      <a:lvl8pPr marL="4800600" indent="-320040" algn="l" defTabSz="1280160" rtl="0" eaLnBrk="1" latinLnBrk="0" hangingPunct="1">
         <a:lnSpc>
           <a:spcPct val="90000"/>
         </a:lnSpc>
         <a:spcBef>
-          <a:spcPts val="375"/>
+          <a:spcPts val="700"/>
         </a:spcBef>
         <a:buFont typeface="Arial" panose="020B0604020202020204" pitchFamily="34" charset="0"/>
         <a:buChar char="•"/>
-        <a:defRPr sz="1350" kern="1200">
+        <a:defRPr sz="2520" kern="1200">
           <a:solidFill>
             <a:schemeClr val="tx1"/>
           </a:solidFill>
@@ -2831,16 +2838,16 @@
           <a:cs typeface="+mn-cs"/>
         </a:defRPr>
       </a:lvl8pPr>
-      <a:lvl9pPr marL="2914650" indent="-171450" algn="l" defTabSz="685800" rtl="0" eaLnBrk="1" latinLnBrk="0" hangingPunct="1">
+      <a:lvl9pPr marL="5440680" indent="-320040" algn="l" defTabSz="1280160" rtl="0" eaLnBrk="1" latinLnBrk="0" hangingPunct="1">
         <a:lnSpc>
           <a:spcPct val="90000"/>
         </a:lnSpc>
         <a:spcBef>
-          <a:spcPts val="375"/>
+          <a:spcPts val="700"/>
         </a:spcBef>
         <a:buFont typeface="Arial" panose="020B0604020202020204" pitchFamily="34" charset="0"/>
         <a:buChar char="•"/>
-        <a:defRPr sz="1350" kern="1200">
+        <a:defRPr sz="2520" kern="1200">
           <a:solidFill>
             <a:schemeClr val="tx1"/>
           </a:solidFill>
@@ -2854,8 +2861,8 @@
       <a:defPPr>
         <a:defRPr lang="en-US"/>
       </a:defPPr>
-      <a:lvl1pPr marL="0" algn="l" defTabSz="685800" rtl="0" eaLnBrk="1" latinLnBrk="0" hangingPunct="1">
-        <a:defRPr sz="1350" kern="1200">
+      <a:lvl1pPr marL="0" algn="l" defTabSz="1280160" rtl="0" eaLnBrk="1" latinLnBrk="0" hangingPunct="1">
+        <a:defRPr sz="2520" kern="1200">
           <a:solidFill>
             <a:schemeClr val="tx1"/>
           </a:solidFill>
@@ -2864,8 +2871,8 @@
           <a:cs typeface="+mn-cs"/>
         </a:defRPr>
       </a:lvl1pPr>
-      <a:lvl2pPr marL="342900" algn="l" defTabSz="685800" rtl="0" eaLnBrk="1" latinLnBrk="0" hangingPunct="1">
-        <a:defRPr sz="1350" kern="1200">
+      <a:lvl2pPr marL="640080" algn="l" defTabSz="1280160" rtl="0" eaLnBrk="1" latinLnBrk="0" hangingPunct="1">
+        <a:defRPr sz="2520" kern="1200">
           <a:solidFill>
             <a:schemeClr val="tx1"/>
           </a:solidFill>
@@ -2874,8 +2881,8 @@
           <a:cs typeface="+mn-cs"/>
         </a:defRPr>
       </a:lvl2pPr>
-      <a:lvl3pPr marL="685800" algn="l" defTabSz="685800" rtl="0" eaLnBrk="1" latinLnBrk="0" hangingPunct="1">
-        <a:defRPr sz="1350" kern="1200">
+      <a:lvl3pPr marL="1280160" algn="l" defTabSz="1280160" rtl="0" eaLnBrk="1" latinLnBrk="0" hangingPunct="1">
+        <a:defRPr sz="2520" kern="1200">
           <a:solidFill>
             <a:schemeClr val="tx1"/>
           </a:solidFill>
@@ -2884,8 +2891,8 @@
           <a:cs typeface="+mn-cs"/>
         </a:defRPr>
       </a:lvl3pPr>
-      <a:lvl4pPr marL="1028700" algn="l" defTabSz="685800" rtl="0" eaLnBrk="1" latinLnBrk="0" hangingPunct="1">
-        <a:defRPr sz="1350" kern="1200">
+      <a:lvl4pPr marL="1920240" algn="l" defTabSz="1280160" rtl="0" eaLnBrk="1" latinLnBrk="0" hangingPunct="1">
+        <a:defRPr sz="2520" kern="1200">
           <a:solidFill>
             <a:schemeClr val="tx1"/>
           </a:solidFill>
@@ -2894,8 +2901,8 @@
           <a:cs typeface="+mn-cs"/>
         </a:defRPr>
       </a:lvl4pPr>
-      <a:lvl5pPr marL="1371600" algn="l" defTabSz="685800" rtl="0" eaLnBrk="1" latinLnBrk="0" hangingPunct="1">
-        <a:defRPr sz="1350" kern="1200">
+      <a:lvl5pPr marL="2560320" algn="l" defTabSz="1280160" rtl="0" eaLnBrk="1" latinLnBrk="0" hangingPunct="1">
+        <a:defRPr sz="2520" kern="1200">
           <a:solidFill>
             <a:schemeClr val="tx1"/>
           </a:solidFill>
@@ -2904,8 +2911,8 @@
           <a:cs typeface="+mn-cs"/>
         </a:defRPr>
       </a:lvl5pPr>
-      <a:lvl6pPr marL="1714500" algn="l" defTabSz="685800" rtl="0" eaLnBrk="1" latinLnBrk="0" hangingPunct="1">
-        <a:defRPr sz="1350" kern="1200">
+      <a:lvl6pPr marL="3200400" algn="l" defTabSz="1280160" rtl="0" eaLnBrk="1" latinLnBrk="0" hangingPunct="1">
+        <a:defRPr sz="2520" kern="1200">
           <a:solidFill>
             <a:schemeClr val="tx1"/>
           </a:solidFill>
@@ -2914,8 +2921,8 @@
           <a:cs typeface="+mn-cs"/>
         </a:defRPr>
       </a:lvl6pPr>
-      <a:lvl7pPr marL="2057400" algn="l" defTabSz="685800" rtl="0" eaLnBrk="1" latinLnBrk="0" hangingPunct="1">
-        <a:defRPr sz="1350" kern="1200">
+      <a:lvl7pPr marL="3840480" algn="l" defTabSz="1280160" rtl="0" eaLnBrk="1" latinLnBrk="0" hangingPunct="1">
+        <a:defRPr sz="2520" kern="1200">
           <a:solidFill>
             <a:schemeClr val="tx1"/>
           </a:solidFill>
@@ -2924,8 +2931,8 @@
           <a:cs typeface="+mn-cs"/>
         </a:defRPr>
       </a:lvl7pPr>
-      <a:lvl8pPr marL="2400300" algn="l" defTabSz="685800" rtl="0" eaLnBrk="1" latinLnBrk="0" hangingPunct="1">
-        <a:defRPr sz="1350" kern="1200">
+      <a:lvl8pPr marL="4480560" algn="l" defTabSz="1280160" rtl="0" eaLnBrk="1" latinLnBrk="0" hangingPunct="1">
+        <a:defRPr sz="2520" kern="1200">
           <a:solidFill>
             <a:schemeClr val="tx1"/>
           </a:solidFill>
@@ -2934,8 +2941,8 @@
           <a:cs typeface="+mn-cs"/>
         </a:defRPr>
       </a:lvl8pPr>
-      <a:lvl9pPr marL="2743200" algn="l" defTabSz="685800" rtl="0" eaLnBrk="1" latinLnBrk="0" hangingPunct="1">
-        <a:defRPr sz="1350" kern="1200">
+      <a:lvl9pPr marL="5120640" algn="l" defTabSz="1280160" rtl="0" eaLnBrk="1" latinLnBrk="0" hangingPunct="1">
+        <a:defRPr sz="2520" kern="1200">
           <a:solidFill>
             <a:schemeClr val="tx1"/>
           </a:solidFill>
@@ -2974,8 +2981,8 @@
         </p:nvSpPr>
         <p:spPr>
           <a:xfrm>
-            <a:off x="135172" y="8092200"/>
-            <a:ext cx="5724939" cy="1434780"/>
+            <a:off x="3208321" y="7843209"/>
+            <a:ext cx="5548787" cy="1390633"/>
           </a:xfrm>
           <a:prstGeom prst="rect">
             <a:avLst/>
@@ -3008,7 +3015,7 @@
           <a:lstStyle/>
           <a:p>
             <a:pPr algn="ctr"/>
-            <a:endParaRPr lang="en-GB"/>
+            <a:endParaRPr lang="en-GB" sz="1745"/>
           </a:p>
         </p:txBody>
       </p:sp>
@@ -3020,8 +3027,8 @@
         </p:nvSpPr>
         <p:spPr>
           <a:xfrm>
-            <a:off x="135172" y="787171"/>
-            <a:ext cx="5724939" cy="7195931"/>
+            <a:off x="3208321" y="762951"/>
+            <a:ext cx="5548787" cy="6974518"/>
           </a:xfrm>
           <a:prstGeom prst="rect">
             <a:avLst/>
@@ -3054,7 +3061,7 @@
           <a:lstStyle/>
           <a:p>
             <a:pPr algn="ctr"/>
-            <a:endParaRPr lang="en-GB"/>
+            <a:endParaRPr lang="en-GB" sz="1745"/>
           </a:p>
         </p:txBody>
       </p:sp>
@@ -3066,8 +3073,8 @@
         </p:nvSpPr>
         <p:spPr>
           <a:xfrm>
-            <a:off x="789953" y="912172"/>
-            <a:ext cx="4315968" cy="369332"/>
+            <a:off x="3842954" y="884105"/>
+            <a:ext cx="4183169" cy="357968"/>
           </a:xfrm>
           <a:prstGeom prst="rect">
             <a:avLst/>
@@ -3089,18 +3096,17 @@
           <a:lstStyle/>
           <a:p>
             <a:r>
-              <a:rPr lang="en-US" dirty="0" smtClean="0"/>
+              <a:rPr lang="en-US" sz="1745" dirty="0"/>
               <a:t>1) settle on ARTS (</a:t>
             </a:r>
             <a:r>
-              <a:rPr lang="en-US" dirty="0" err="1" smtClean="0"/>
+              <a:rPr lang="en-US" sz="1745" dirty="0" err="1"/>
               <a:t>quadro</a:t>
             </a:r>
             <a:r>
-              <a:rPr lang="en-US" dirty="0" smtClean="0"/>
+              <a:rPr lang="en-US" sz="1745" dirty="0"/>
               <a:t>, mono, mixture)</a:t>
             </a:r>
-            <a:endParaRPr lang="en-US" dirty="0"/>
           </a:p>
         </p:txBody>
       </p:sp>
@@ -3112,8 +3118,8 @@
         </p:nvSpPr>
         <p:spPr>
           <a:xfrm>
-            <a:off x="789954" y="1584422"/>
-            <a:ext cx="4315968" cy="369332"/>
+            <a:off x="3842955" y="1535671"/>
+            <a:ext cx="4183169" cy="357968"/>
           </a:xfrm>
           <a:prstGeom prst="rect">
             <a:avLst/>
@@ -3135,10 +3141,9 @@
           <a:lstStyle/>
           <a:p>
             <a:r>
-              <a:rPr lang="en-US" dirty="0" smtClean="0"/>
+              <a:rPr lang="en-US" sz="1745" dirty="0"/>
               <a:t>2) setup ARTS in field</a:t>
             </a:r>
-            <a:endParaRPr lang="en-US" dirty="0"/>
           </a:p>
         </p:txBody>
       </p:sp>
@@ -3150,8 +3155,8 @@
         </p:nvSpPr>
         <p:spPr>
           <a:xfrm>
-            <a:off x="789953" y="2227919"/>
-            <a:ext cx="4315969" cy="369332"/>
+            <a:off x="3842955" y="2159368"/>
+            <a:ext cx="4183170" cy="357968"/>
           </a:xfrm>
           <a:prstGeom prst="rect">
             <a:avLst/>
@@ -3173,10 +3178,9 @@
           <a:lstStyle/>
           <a:p>
             <a:r>
-              <a:rPr lang="en-US" dirty="0" smtClean="0"/>
+              <a:rPr lang="en-US" sz="1745" dirty="0"/>
               <a:t>3) GT data (circles, random walk?)</a:t>
             </a:r>
-            <a:endParaRPr lang="en-US" dirty="0"/>
           </a:p>
         </p:txBody>
       </p:sp>
@@ -3188,8 +3192,8 @@
         </p:nvSpPr>
         <p:spPr>
           <a:xfrm>
-            <a:off x="789954" y="2871416"/>
-            <a:ext cx="4315968" cy="1200329"/>
+            <a:off x="3842955" y="2783065"/>
+            <a:ext cx="4183169" cy="1163396"/>
           </a:xfrm>
           <a:prstGeom prst="rect">
             <a:avLst/>
@@ -3211,30 +3215,21 @@
           <a:lstStyle/>
           <a:p>
             <a:r>
-              <a:rPr lang="en-US" dirty="0" smtClean="0"/>
+              <a:rPr lang="en-US" sz="1745" dirty="0"/>
               <a:t>4) evaluate position error &amp; area coverage, first optimization of thresholds</a:t>
             </a:r>
           </a:p>
           <a:p>
             <a:r>
-              <a:rPr lang="en-US" dirty="0"/>
+              <a:rPr lang="en-US" sz="1745" dirty="0"/>
               <a:t>-&gt; bad? rearrange setup and repeat 3) &amp; 4)</a:t>
             </a:r>
           </a:p>
           <a:p>
             <a:r>
-              <a:rPr lang="en-US" dirty="0" smtClean="0"/>
-              <a:t>-&gt; </a:t>
-            </a:r>
-            <a:r>
-              <a:rPr lang="en-US" dirty="0"/>
-              <a:t>good? </a:t>
-            </a:r>
-            <a:r>
-              <a:rPr lang="en-US" dirty="0" smtClean="0"/>
-              <a:t>continue</a:t>
-            </a:r>
-            <a:endParaRPr lang="en-US" dirty="0"/>
+              <a:rPr lang="en-US" sz="1745" dirty="0"/>
+              <a:t>-&gt; good? continue</a:t>
+            </a:r>
           </a:p>
         </p:txBody>
       </p:sp>
@@ -3246,8 +3241,8 @@
         </p:nvSpPr>
         <p:spPr>
           <a:xfrm>
-            <a:off x="789953" y="4265147"/>
-            <a:ext cx="4315968" cy="646331"/>
+            <a:off x="3842954" y="4133912"/>
+            <a:ext cx="4183169" cy="626444"/>
           </a:xfrm>
           <a:prstGeom prst="rect">
             <a:avLst/>
@@ -3269,10 +3264,9 @@
           <a:lstStyle/>
           <a:p>
             <a:r>
-              <a:rPr lang="en-US" dirty="0" smtClean="0"/>
+              <a:rPr lang="en-US" sz="1745" dirty="0"/>
               <a:t>6) collect animal data &amp; additional GT data (to ensure, position error is still good)</a:t>
             </a:r>
-            <a:endParaRPr lang="en-US" dirty="0"/>
           </a:p>
         </p:txBody>
       </p:sp>
@@ -3284,8 +3278,8 @@
         </p:nvSpPr>
         <p:spPr>
           <a:xfrm>
-            <a:off x="789953" y="5134353"/>
-            <a:ext cx="4315968" cy="923330"/>
+            <a:off x="3842954" y="4976373"/>
+            <a:ext cx="4183169" cy="894920"/>
           </a:xfrm>
           <a:prstGeom prst="rect">
             <a:avLst/>
@@ -3307,10 +3301,9 @@
           <a:lstStyle/>
           <a:p>
             <a:r>
-              <a:rPr lang="en-US" dirty="0" smtClean="0"/>
+              <a:rPr lang="en-US" sz="1745" dirty="0"/>
               <a:t>7) evaluate position error &amp; area coverage, optimize &amp; adapt thresholds to minimize error and to suit aim of study</a:t>
             </a:r>
-            <a:endParaRPr lang="en-US" dirty="0"/>
           </a:p>
         </p:txBody>
       </p:sp>
@@ -3322,8 +3315,8 @@
         </p:nvSpPr>
         <p:spPr>
           <a:xfrm>
-            <a:off x="789953" y="7192128"/>
-            <a:ext cx="4315968" cy="646331"/>
+            <a:off x="3842954" y="6970832"/>
+            <a:ext cx="4183169" cy="626444"/>
           </a:xfrm>
           <a:prstGeom prst="rect">
             <a:avLst/>
@@ -3345,10 +3338,9 @@
           <a:lstStyle/>
           <a:p>
             <a:r>
-              <a:rPr lang="en-US" dirty="0" smtClean="0"/>
+              <a:rPr lang="en-US" sz="1745" dirty="0"/>
               <a:t>9) calculate animal positions including error based on raster</a:t>
             </a:r>
-            <a:endParaRPr lang="en-US" dirty="0"/>
           </a:p>
         </p:txBody>
       </p:sp>
@@ -3360,8 +3352,8 @@
         </p:nvSpPr>
         <p:spPr>
           <a:xfrm>
-            <a:off x="789953" y="6280558"/>
-            <a:ext cx="4315968" cy="646331"/>
+            <a:off x="3842954" y="6087310"/>
+            <a:ext cx="4183169" cy="626444"/>
           </a:xfrm>
           <a:prstGeom prst="rect">
             <a:avLst/>
@@ -3383,10 +3375,9 @@
           <a:lstStyle/>
           <a:p>
             <a:r>
-              <a:rPr lang="en-US" dirty="0" smtClean="0"/>
+              <a:rPr lang="en-US" sz="1745" dirty="0"/>
               <a:t>8) generate raster of study area with mean position error based on GT data</a:t>
             </a:r>
-            <a:endParaRPr lang="en-US" dirty="0"/>
           </a:p>
         </p:txBody>
       </p:sp>
@@ -3398,8 +3389,8 @@
         </p:nvSpPr>
         <p:spPr>
           <a:xfrm>
-            <a:off x="789953" y="8493884"/>
-            <a:ext cx="4315968" cy="646331"/>
+            <a:off x="3842954" y="8232534"/>
+            <a:ext cx="4183169" cy="626444"/>
           </a:xfrm>
           <a:prstGeom prst="rect">
             <a:avLst/>
@@ -3421,18 +3412,17 @@
           <a:lstStyle/>
           <a:p>
             <a:r>
-              <a:rPr lang="en-US" dirty="0" smtClean="0"/>
+              <a:rPr lang="en-US" sz="1745" dirty="0"/>
               <a:t>10) integrate position error in further analysis (e.g. </a:t>
             </a:r>
             <a:r>
-              <a:rPr lang="en-US" dirty="0" err="1" smtClean="0"/>
+              <a:rPr lang="en-US" sz="1745" dirty="0" err="1"/>
               <a:t>homerange</a:t>
             </a:r>
             <a:r>
-              <a:rPr lang="en-US" dirty="0" smtClean="0"/>
+              <a:rPr lang="en-US" sz="1745" dirty="0"/>
               <a:t>, habitat use, …)</a:t>
             </a:r>
-            <a:endParaRPr lang="en-US" dirty="0"/>
           </a:p>
         </p:txBody>
       </p:sp>
@@ -3444,8 +3434,8 @@
         </p:nvSpPr>
         <p:spPr>
           <a:xfrm>
-            <a:off x="135172" y="114772"/>
-            <a:ext cx="5724939" cy="461665"/>
+            <a:off x="3208321" y="111241"/>
+            <a:ext cx="5548787" cy="447460"/>
           </a:xfrm>
           <a:prstGeom prst="rect">
             <a:avLst/>
@@ -3467,14 +3457,14 @@
           <a:lstStyle/>
           <a:p>
             <a:r>
-              <a:rPr lang="de-DE" sz="2400" b="1" dirty="0" smtClean="0"/>
+              <a:rPr lang="de-DE" sz="2326" b="1" dirty="0"/>
               <a:t>	  ARTS </a:t>
             </a:r>
             <a:r>
-              <a:rPr lang="de-DE" sz="2400" b="1" dirty="0" err="1" smtClean="0"/>
+              <a:rPr lang="de-DE" sz="2326" b="1" dirty="0" err="1"/>
               <a:t>workflow</a:t>
             </a:r>
-            <a:endParaRPr lang="en-GB" sz="2400" b="1" dirty="0"/>
+            <a:endParaRPr lang="en-GB" sz="2326" b="1" dirty="0"/>
           </a:p>
         </p:txBody>
       </p:sp>
@@ -3486,8 +3476,8 @@
         </p:nvSpPr>
         <p:spPr>
           <a:xfrm rot="16200000">
-            <a:off x="4211402" y="2264937"/>
-            <a:ext cx="2099940" cy="738910"/>
+            <a:off x="7159128" y="2195247"/>
+            <a:ext cx="2035326" cy="716174"/>
           </a:xfrm>
           <a:prstGeom prst="curvedUpArrow">
             <a:avLst/>
@@ -3522,7 +3512,7 @@
           <a:lstStyle/>
           <a:p>
             <a:pPr algn="ctr"/>
-            <a:endParaRPr lang="en-GB">
+            <a:endParaRPr lang="en-GB" sz="1745">
               <a:solidFill>
                 <a:schemeClr val="tx1"/>
               </a:solidFill>
@@ -3538,8 +3528,8 @@
         </p:nvSpPr>
         <p:spPr>
           <a:xfrm>
-            <a:off x="4891917" y="3813526"/>
-            <a:ext cx="738910" cy="1017488"/>
+            <a:off x="7818704" y="3696187"/>
+            <a:ext cx="716174" cy="986181"/>
           </a:xfrm>
           <a:prstGeom prst="curvedLeftArrow">
             <a:avLst/>
@@ -3574,7 +3564,7 @@
           <a:lstStyle/>
           <a:p>
             <a:pPr algn="ctr"/>
-            <a:endParaRPr lang="en-GB">
+            <a:endParaRPr lang="en-GB" sz="1745">
               <a:solidFill>
                 <a:schemeClr val="tx1"/>
               </a:solidFill>
@@ -3590,8 +3580,8 @@
         </p:nvSpPr>
         <p:spPr>
           <a:xfrm rot="16200000">
-            <a:off x="-3146138" y="4193484"/>
-            <a:ext cx="6931956" cy="369332"/>
+            <a:off x="27974" y="4064454"/>
+            <a:ext cx="6718665" cy="357968"/>
           </a:xfrm>
           <a:prstGeom prst="rect">
             <a:avLst/>
@@ -3606,26 +3596,26 @@
           <a:p>
             <a:pPr algn="ctr"/>
             <a:r>
-              <a:rPr lang="de-DE" dirty="0" err="1" smtClean="0"/>
+              <a:rPr lang="de-DE" sz="1745" dirty="0" err="1"/>
               <a:t>included</a:t>
             </a:r>
             <a:r>
-              <a:rPr lang="de-DE" dirty="0" smtClean="0"/>
+              <a:rPr lang="de-DE" sz="1745" dirty="0"/>
               <a:t> in </a:t>
             </a:r>
             <a:r>
-              <a:rPr lang="de-DE" dirty="0" err="1" smtClean="0"/>
+              <a:rPr lang="de-DE" sz="1745" dirty="0" err="1"/>
               <a:t>this</a:t>
             </a:r>
             <a:r>
-              <a:rPr lang="de-DE" dirty="0" smtClean="0"/>
+              <a:rPr lang="de-DE" sz="1745" dirty="0"/>
               <a:t> </a:t>
             </a:r>
             <a:r>
-              <a:rPr lang="de-DE" dirty="0" err="1" smtClean="0"/>
+              <a:rPr lang="de-DE" sz="1745" dirty="0" err="1"/>
               <a:t>study</a:t>
             </a:r>
-            <a:endParaRPr lang="en-GB" dirty="0"/>
+            <a:endParaRPr lang="en-GB" sz="1745" dirty="0"/>
           </a:p>
         </p:txBody>
       </p:sp>
@@ -3637,8 +3627,8 @@
         </p:nvSpPr>
         <p:spPr>
           <a:xfrm rot="16200000">
-            <a:off x="-339506" y="8624923"/>
-            <a:ext cx="1434780" cy="369332"/>
+            <a:off x="2748248" y="8359541"/>
+            <a:ext cx="1390633" cy="357968"/>
           </a:xfrm>
           <a:prstGeom prst="rect">
             <a:avLst/>
@@ -3653,10 +3643,10 @@
           <a:p>
             <a:pPr algn="ctr"/>
             <a:r>
-              <a:rPr lang="de-DE" dirty="0" err="1" smtClean="0"/>
+              <a:rPr lang="de-DE" sz="1745" dirty="0" err="1"/>
               <a:t>prospects</a:t>
             </a:r>
-            <a:endParaRPr lang="en-GB" dirty="0"/>
+            <a:endParaRPr lang="en-GB" sz="1745" dirty="0"/>
           </a:p>
         </p:txBody>
       </p:sp>
@@ -3664,6 +3654,404 @@
     <p:extLst>
       <p:ext uri="{BB962C8B-B14F-4D97-AF65-F5344CB8AC3E}">
         <p14:creationId xmlns:p14="http://schemas.microsoft.com/office/powerpoint/2010/main" val="2207189405"/>
+      </p:ext>
+    </p:extLst>
+  </p:cSld>
+  <p:clrMapOvr>
+    <a:masterClrMapping/>
+  </p:clrMapOvr>
+</p:sld>
+</file>
+
+<file path=ppt/slides/slide2.xml><?xml version="1.0" encoding="utf-8"?>
+<p:sld xmlns:a="http://schemas.openxmlformats.org/drawingml/2006/main" xmlns:r="http://schemas.openxmlformats.org/officeDocument/2006/relationships" xmlns:p="http://schemas.openxmlformats.org/presentationml/2006/main">
+  <p:cSld>
+    <p:spTree>
+      <p:nvGrpSpPr>
+        <p:cNvPr id="1" name=""/>
+        <p:cNvGrpSpPr/>
+        <p:nvPr/>
+      </p:nvGrpSpPr>
+      <p:grpSpPr>
+        <a:xfrm>
+          <a:off x="0" y="0"/>
+          <a:ext cx="0" cy="0"/>
+          <a:chOff x="0" y="0"/>
+          <a:chExt cx="0" cy="0"/>
+        </a:xfrm>
+      </p:grpSpPr>
+      <p:grpSp>
+        <p:nvGrpSpPr>
+          <p:cNvPr id="11" name="Gruppieren 10"/>
+          <p:cNvGrpSpPr/>
+          <p:nvPr/>
+        </p:nvGrpSpPr>
+        <p:grpSpPr>
+          <a:xfrm>
+            <a:off x="-1" y="2146754"/>
+            <a:ext cx="12668043" cy="4831561"/>
+            <a:chOff x="-1" y="2146754"/>
+            <a:chExt cx="12668043" cy="4831561"/>
+          </a:xfrm>
+        </p:grpSpPr>
+        <p:grpSp>
+          <p:nvGrpSpPr>
+            <p:cNvPr id="7" name="Gruppieren 6"/>
+            <p:cNvGrpSpPr/>
+            <p:nvPr/>
+          </p:nvGrpSpPr>
+          <p:grpSpPr>
+            <a:xfrm>
+              <a:off x="-1" y="2146754"/>
+              <a:ext cx="12668043" cy="4831561"/>
+              <a:chOff x="0" y="2711447"/>
+              <a:chExt cx="6858000" cy="2615625"/>
+            </a:xfrm>
+          </p:grpSpPr>
+          <p:pic>
+            <p:nvPicPr>
+              <p:cNvPr id="4" name="Grafik 3"/>
+              <p:cNvPicPr>
+                <a:picLocks noChangeAspect="1"/>
+              </p:cNvPicPr>
+              <p:nvPr/>
+            </p:nvPicPr>
+            <p:blipFill rotWithShape="1">
+              <a:blip r:embed="rId2" cstate="print">
+                <a:extLst>
+                  <a:ext uri="{28A0092B-C50C-407E-A947-70E740481C1C}">
+                    <a14:useLocalDpi xmlns:a14="http://schemas.microsoft.com/office/drawing/2010/main" val="0"/>
+                  </a:ext>
+                </a:extLst>
+              </a:blip>
+              <a:srcRect r="6276"/>
+              <a:stretch/>
+            </p:blipFill>
+            <p:spPr>
+              <a:xfrm>
+                <a:off x="0" y="2711449"/>
+                <a:ext cx="2451467" cy="2615623"/>
+              </a:xfrm>
+              <a:prstGeom prst="rect">
+                <a:avLst/>
+              </a:prstGeom>
+            </p:spPr>
+          </p:pic>
+          <p:pic>
+            <p:nvPicPr>
+              <p:cNvPr id="5" name="Grafik 4"/>
+              <p:cNvPicPr>
+                <a:picLocks noChangeAspect="1"/>
+              </p:cNvPicPr>
+              <p:nvPr/>
+            </p:nvPicPr>
+            <p:blipFill rotWithShape="1">
+              <a:blip r:embed="rId3" cstate="print">
+                <a:extLst>
+                  <a:ext uri="{28A0092B-C50C-407E-A947-70E740481C1C}">
+                    <a14:useLocalDpi xmlns:a14="http://schemas.microsoft.com/office/drawing/2010/main" val="0"/>
+                  </a:ext>
+                </a:extLst>
+              </a:blip>
+              <a:srcRect l="11325"/>
+              <a:stretch/>
+            </p:blipFill>
+            <p:spPr>
+              <a:xfrm>
+                <a:off x="2514967" y="2711447"/>
+                <a:ext cx="2319381" cy="2615623"/>
+              </a:xfrm>
+              <a:prstGeom prst="rect">
+                <a:avLst/>
+              </a:prstGeom>
+            </p:spPr>
+          </p:pic>
+          <p:pic>
+            <p:nvPicPr>
+              <p:cNvPr id="6" name="Grafik 5"/>
+              <p:cNvPicPr>
+                <a:picLocks noChangeAspect="1"/>
+              </p:cNvPicPr>
+              <p:nvPr/>
+            </p:nvPicPr>
+            <p:blipFill rotWithShape="1">
+              <a:blip r:embed="rId4" cstate="print">
+                <a:extLst>
+                  <a:ext uri="{28A0092B-C50C-407E-A947-70E740481C1C}">
+                    <a14:useLocalDpi xmlns:a14="http://schemas.microsoft.com/office/drawing/2010/main" val="0"/>
+                  </a:ext>
+                </a:extLst>
+              </a:blip>
+              <a:srcRect l="11076" r="5716"/>
+              <a:stretch/>
+            </p:blipFill>
+            <p:spPr>
+              <a:xfrm>
+                <a:off x="4681575" y="2711448"/>
+                <a:ext cx="2176425" cy="2615623"/>
+              </a:xfrm>
+              <a:prstGeom prst="rect">
+                <a:avLst/>
+              </a:prstGeom>
+            </p:spPr>
+          </p:pic>
+        </p:grpSp>
+        <p:sp>
+          <p:nvSpPr>
+            <p:cNvPr id="8" name="Textfeld 7"/>
+            <p:cNvSpPr txBox="1"/>
+            <p:nvPr/>
+          </p:nvSpPr>
+          <p:spPr>
+            <a:xfrm>
+              <a:off x="610361" y="2415274"/>
+              <a:ext cx="3759797" cy="461665"/>
+            </a:xfrm>
+            <a:prstGeom prst="rect">
+              <a:avLst/>
+            </a:prstGeom>
+            <a:solidFill>
+              <a:schemeClr val="bg1">
+                <a:lumMod val="75000"/>
+              </a:schemeClr>
+            </a:solidFill>
+          </p:spPr>
+          <p:txBody>
+            <a:bodyPr wrap="square" rtlCol="0">
+              <a:spAutoFit/>
+            </a:bodyPr>
+            <a:lstStyle/>
+            <a:p>
+              <a:pPr algn="ctr"/>
+              <a:r>
+                <a:rPr lang="de-DE" sz="2400" dirty="0" err="1" smtClean="0">
+                  <a:solidFill>
+                    <a:schemeClr val="bg1"/>
+                  </a:solidFill>
+                  <a:latin typeface="Arial" panose="020B0604020202020204" pitchFamily="34" charset="0"/>
+                  <a:cs typeface="Arial" panose="020B0604020202020204" pitchFamily="34" charset="0"/>
+                </a:rPr>
+                <a:t>angulation</a:t>
+              </a:r>
+              <a:endParaRPr lang="en-GB" sz="2400" dirty="0">
+                <a:solidFill>
+                  <a:schemeClr val="bg1"/>
+                </a:solidFill>
+                <a:latin typeface="Arial" panose="020B0604020202020204" pitchFamily="34" charset="0"/>
+                <a:cs typeface="Arial" panose="020B0604020202020204" pitchFamily="34" charset="0"/>
+              </a:endParaRPr>
+            </a:p>
+          </p:txBody>
+        </p:sp>
+        <p:sp>
+          <p:nvSpPr>
+            <p:cNvPr id="9" name="Textfeld 8"/>
+            <p:cNvSpPr txBox="1"/>
+            <p:nvPr/>
+          </p:nvSpPr>
+          <p:spPr>
+            <a:xfrm>
+              <a:off x="4688687" y="2415275"/>
+              <a:ext cx="3761595" cy="461665"/>
+            </a:xfrm>
+            <a:prstGeom prst="rect">
+              <a:avLst/>
+            </a:prstGeom>
+            <a:solidFill>
+              <a:schemeClr val="bg1">
+                <a:lumMod val="75000"/>
+              </a:schemeClr>
+            </a:solidFill>
+          </p:spPr>
+          <p:txBody>
+            <a:bodyPr wrap="square" rtlCol="0">
+              <a:spAutoFit/>
+            </a:bodyPr>
+            <a:lstStyle/>
+            <a:p>
+              <a:pPr algn="ctr"/>
+              <a:r>
+                <a:rPr lang="de-DE" sz="2400" dirty="0" err="1" smtClean="0">
+                  <a:solidFill>
+                    <a:schemeClr val="bg1"/>
+                  </a:solidFill>
+                  <a:latin typeface="Arial" panose="020B0604020202020204" pitchFamily="34" charset="0"/>
+                  <a:cs typeface="Arial" panose="020B0604020202020204" pitchFamily="34" charset="0"/>
+                </a:rPr>
+                <a:t>antenna</a:t>
+              </a:r>
+              <a:r>
+                <a:rPr lang="de-DE" sz="2400" dirty="0" smtClean="0">
+                  <a:solidFill>
+                    <a:schemeClr val="bg1"/>
+                  </a:solidFill>
+                  <a:latin typeface="Arial" panose="020B0604020202020204" pitchFamily="34" charset="0"/>
+                  <a:cs typeface="Arial" panose="020B0604020202020204" pitchFamily="34" charset="0"/>
+                </a:rPr>
+                <a:t> </a:t>
+              </a:r>
+              <a:r>
+                <a:rPr lang="de-DE" sz="2400" dirty="0" err="1">
+                  <a:solidFill>
+                    <a:schemeClr val="bg1"/>
+                  </a:solidFill>
+                  <a:latin typeface="Arial" panose="020B0604020202020204" pitchFamily="34" charset="0"/>
+                  <a:cs typeface="Arial" panose="020B0604020202020204" pitchFamily="34" charset="0"/>
+                </a:rPr>
+                <a:t>beams</a:t>
+              </a:r>
+              <a:endParaRPr lang="en-GB" sz="2400" dirty="0">
+                <a:solidFill>
+                  <a:schemeClr val="bg1"/>
+                </a:solidFill>
+                <a:latin typeface="Arial" panose="020B0604020202020204" pitchFamily="34" charset="0"/>
+                <a:cs typeface="Arial" panose="020B0604020202020204" pitchFamily="34" charset="0"/>
+              </a:endParaRPr>
+            </a:p>
+          </p:txBody>
+        </p:sp>
+        <p:sp>
+          <p:nvSpPr>
+            <p:cNvPr id="10" name="Textfeld 9"/>
+            <p:cNvSpPr txBox="1"/>
+            <p:nvPr/>
+          </p:nvSpPr>
+          <p:spPr>
+            <a:xfrm>
+              <a:off x="8722880" y="2415274"/>
+              <a:ext cx="3729543" cy="461665"/>
+            </a:xfrm>
+            <a:prstGeom prst="rect">
+              <a:avLst/>
+            </a:prstGeom>
+            <a:solidFill>
+              <a:schemeClr val="bg1">
+                <a:lumMod val="75000"/>
+              </a:schemeClr>
+            </a:solidFill>
+          </p:spPr>
+          <p:txBody>
+            <a:bodyPr wrap="square" rtlCol="0">
+              <a:spAutoFit/>
+            </a:bodyPr>
+            <a:lstStyle/>
+            <a:p>
+              <a:pPr algn="ctr"/>
+              <a:r>
+                <a:rPr lang="de-DE" sz="2400" dirty="0" err="1" smtClean="0">
+                  <a:solidFill>
+                    <a:schemeClr val="bg1"/>
+                  </a:solidFill>
+                  <a:latin typeface="Arial" panose="020B0604020202020204" pitchFamily="34" charset="0"/>
+                  <a:cs typeface="Arial" panose="020B0604020202020204" pitchFamily="34" charset="0"/>
+                </a:rPr>
+                <a:t>multilateration</a:t>
+              </a:r>
+              <a:endParaRPr lang="en-GB" sz="2400" dirty="0">
+                <a:solidFill>
+                  <a:schemeClr val="bg1"/>
+                </a:solidFill>
+                <a:latin typeface="Arial" panose="020B0604020202020204" pitchFamily="34" charset="0"/>
+                <a:cs typeface="Arial" panose="020B0604020202020204" pitchFamily="34" charset="0"/>
+              </a:endParaRPr>
+            </a:p>
+          </p:txBody>
+        </p:sp>
+      </p:grpSp>
+    </p:spTree>
+    <p:extLst>
+      <p:ext uri="{BB962C8B-B14F-4D97-AF65-F5344CB8AC3E}">
+        <p14:creationId xmlns:p14="http://schemas.microsoft.com/office/powerpoint/2010/main" val="3483120669"/>
+      </p:ext>
+    </p:extLst>
+  </p:cSld>
+  <p:clrMapOvr>
+    <a:masterClrMapping/>
+  </p:clrMapOvr>
+</p:sld>
+</file>
+
+<file path=ppt/slides/slide3.xml><?xml version="1.0" encoding="utf-8"?>
+<p:sld xmlns:a="http://schemas.openxmlformats.org/drawingml/2006/main" xmlns:r="http://schemas.openxmlformats.org/officeDocument/2006/relationships" xmlns:p="http://schemas.openxmlformats.org/presentationml/2006/main">
+  <p:cSld>
+    <p:spTree>
+      <p:nvGrpSpPr>
+        <p:cNvPr id="1" name=""/>
+        <p:cNvGrpSpPr/>
+        <p:nvPr/>
+      </p:nvGrpSpPr>
+      <p:grpSpPr>
+        <a:xfrm>
+          <a:off x="0" y="0"/>
+          <a:ext cx="0" cy="0"/>
+          <a:chOff x="0" y="0"/>
+          <a:chExt cx="0" cy="0"/>
+        </a:xfrm>
+      </p:grpSpPr>
+      <p:pic>
+        <p:nvPicPr>
+          <p:cNvPr id="2" name="Grafik 1"/>
+          <p:cNvPicPr>
+            <a:picLocks noChangeAspect="1"/>
+          </p:cNvPicPr>
+          <p:nvPr/>
+        </p:nvPicPr>
+        <p:blipFill>
+          <a:blip r:embed="rId2" cstate="print">
+            <a:extLst>
+              <a:ext uri="{28A0092B-C50C-407E-A947-70E740481C1C}">
+                <a14:useLocalDpi xmlns:a14="http://schemas.microsoft.com/office/drawing/2010/main" val="0"/>
+              </a:ext>
+            </a:extLst>
+          </a:blip>
+          <a:stretch>
+            <a:fillRect/>
+          </a:stretch>
+        </p:blipFill>
+        <p:spPr>
+          <a:xfrm>
+            <a:off x="5702300" y="3064668"/>
+            <a:ext cx="6777567" cy="3812381"/>
+          </a:xfrm>
+          <a:prstGeom prst="rect">
+            <a:avLst/>
+          </a:prstGeom>
+        </p:spPr>
+      </p:pic>
+      <p:pic>
+        <p:nvPicPr>
+          <p:cNvPr id="3" name="Grafik 2"/>
+          <p:cNvPicPr>
+            <a:picLocks noChangeAspect="1"/>
+          </p:cNvPicPr>
+          <p:nvPr/>
+        </p:nvPicPr>
+        <p:blipFill>
+          <a:blip r:embed="rId3" cstate="print">
+            <a:extLst>
+              <a:ext uri="{28A0092B-C50C-407E-A947-70E740481C1C}">
+                <a14:useLocalDpi xmlns:a14="http://schemas.microsoft.com/office/drawing/2010/main" val="0"/>
+              </a:ext>
+            </a:extLst>
+          </a:blip>
+          <a:stretch>
+            <a:fillRect/>
+          </a:stretch>
+        </p:blipFill>
+        <p:spPr>
+          <a:xfrm>
+            <a:off x="9840" y="3138486"/>
+            <a:ext cx="5692460" cy="3724276"/>
+          </a:xfrm>
+          <a:prstGeom prst="rect">
+            <a:avLst/>
+          </a:prstGeom>
+        </p:spPr>
+      </p:pic>
+    </p:spTree>
+    <p:extLst>
+      <p:ext uri="{BB962C8B-B14F-4D97-AF65-F5344CB8AC3E}">
+        <p14:creationId xmlns:p14="http://schemas.microsoft.com/office/powerpoint/2010/main" val="429373952"/>
       </p:ext>
     </p:extLst>
   </p:cSld>

</xml_diff>

<commit_message>
rearranged repository and started to make scripts publication ready
</commit_message>
<xml_diff>
--- a/Workflow.pptx
+++ b/Workflow.pptx
@@ -8,6 +8,7 @@
     <p:sldId id="257" r:id="rId2"/>
     <p:sldId id="258" r:id="rId3"/>
     <p:sldId id="259" r:id="rId4"/>
+    <p:sldId id="260" r:id="rId5"/>
   </p:sldIdLst>
   <p:sldSz cx="12801600" cy="9601200" type="A3"/>
   <p:notesSz cx="6858000" cy="9144000"/>
@@ -245,7 +246,7 @@
           <a:p>
             <a:fld id="{7B1FDBB2-CFF6-41ED-8C63-CF8DE01FC2E7}" type="datetimeFigureOut">
               <a:rPr lang="en-GB" smtClean="0"/>
-              <a:t>03/04/2025</a:t>
+              <a:t>10/04/2025</a:t>
             </a:fld>
             <a:endParaRPr lang="en-GB"/>
           </a:p>
@@ -415,7 +416,7 @@
           <a:p>
             <a:fld id="{7B1FDBB2-CFF6-41ED-8C63-CF8DE01FC2E7}" type="datetimeFigureOut">
               <a:rPr lang="en-GB" smtClean="0"/>
-              <a:t>03/04/2025</a:t>
+              <a:t>10/04/2025</a:t>
             </a:fld>
             <a:endParaRPr lang="en-GB"/>
           </a:p>
@@ -595,7 +596,7 @@
           <a:p>
             <a:fld id="{7B1FDBB2-CFF6-41ED-8C63-CF8DE01FC2E7}" type="datetimeFigureOut">
               <a:rPr lang="en-GB" smtClean="0"/>
-              <a:t>03/04/2025</a:t>
+              <a:t>10/04/2025</a:t>
             </a:fld>
             <a:endParaRPr lang="en-GB"/>
           </a:p>
@@ -765,7 +766,7 @@
           <a:p>
             <a:fld id="{7B1FDBB2-CFF6-41ED-8C63-CF8DE01FC2E7}" type="datetimeFigureOut">
               <a:rPr lang="en-GB" smtClean="0"/>
-              <a:t>03/04/2025</a:t>
+              <a:t>10/04/2025</a:t>
             </a:fld>
             <a:endParaRPr lang="en-GB"/>
           </a:p>
@@ -1009,7 +1010,7 @@
           <a:p>
             <a:fld id="{7B1FDBB2-CFF6-41ED-8C63-CF8DE01FC2E7}" type="datetimeFigureOut">
               <a:rPr lang="en-GB" smtClean="0"/>
-              <a:t>03/04/2025</a:t>
+              <a:t>10/04/2025</a:t>
             </a:fld>
             <a:endParaRPr lang="en-GB"/>
           </a:p>
@@ -1241,7 +1242,7 @@
           <a:p>
             <a:fld id="{7B1FDBB2-CFF6-41ED-8C63-CF8DE01FC2E7}" type="datetimeFigureOut">
               <a:rPr lang="en-GB" smtClean="0"/>
-              <a:t>03/04/2025</a:t>
+              <a:t>10/04/2025</a:t>
             </a:fld>
             <a:endParaRPr lang="en-GB"/>
           </a:p>
@@ -1608,7 +1609,7 @@
           <a:p>
             <a:fld id="{7B1FDBB2-CFF6-41ED-8C63-CF8DE01FC2E7}" type="datetimeFigureOut">
               <a:rPr lang="en-GB" smtClean="0"/>
-              <a:t>03/04/2025</a:t>
+              <a:t>10/04/2025</a:t>
             </a:fld>
             <a:endParaRPr lang="en-GB"/>
           </a:p>
@@ -1726,7 +1727,7 @@
           <a:p>
             <a:fld id="{7B1FDBB2-CFF6-41ED-8C63-CF8DE01FC2E7}" type="datetimeFigureOut">
               <a:rPr lang="en-GB" smtClean="0"/>
-              <a:t>03/04/2025</a:t>
+              <a:t>10/04/2025</a:t>
             </a:fld>
             <a:endParaRPr lang="en-GB"/>
           </a:p>
@@ -1821,7 +1822,7 @@
           <a:p>
             <a:fld id="{7B1FDBB2-CFF6-41ED-8C63-CF8DE01FC2E7}" type="datetimeFigureOut">
               <a:rPr lang="en-GB" smtClean="0"/>
-              <a:t>03/04/2025</a:t>
+              <a:t>10/04/2025</a:t>
             </a:fld>
             <a:endParaRPr lang="en-GB"/>
           </a:p>
@@ -2098,7 +2099,7 @@
           <a:p>
             <a:fld id="{7B1FDBB2-CFF6-41ED-8C63-CF8DE01FC2E7}" type="datetimeFigureOut">
               <a:rPr lang="en-GB" smtClean="0"/>
-              <a:t>03/04/2025</a:t>
+              <a:t>10/04/2025</a:t>
             </a:fld>
             <a:endParaRPr lang="en-GB"/>
           </a:p>
@@ -2355,7 +2356,7 @@
           <a:p>
             <a:fld id="{7B1FDBB2-CFF6-41ED-8C63-CF8DE01FC2E7}" type="datetimeFigureOut">
               <a:rPr lang="en-GB" smtClean="0"/>
-              <a:t>03/04/2025</a:t>
+              <a:t>10/04/2025</a:t>
             </a:fld>
             <a:endParaRPr lang="en-GB"/>
           </a:p>
@@ -2568,7 +2569,7 @@
           <a:p>
             <a:fld id="{7B1FDBB2-CFF6-41ED-8C63-CF8DE01FC2E7}" type="datetimeFigureOut">
               <a:rPr lang="en-GB" smtClean="0"/>
-              <a:t>03/04/2025</a:t>
+              <a:t>10/04/2025</a:t>
             </a:fld>
             <a:endParaRPr lang="en-GB"/>
           </a:p>
@@ -4061,6 +4062,109 @@
 </p:sld>
 </file>
 
+<file path=ppt/slides/slide4.xml><?xml version="1.0" encoding="utf-8"?>
+<p:sld xmlns:a="http://schemas.openxmlformats.org/drawingml/2006/main" xmlns:r="http://schemas.openxmlformats.org/officeDocument/2006/relationships" xmlns:p="http://schemas.openxmlformats.org/presentationml/2006/main">
+  <p:cSld>
+    <p:spTree>
+      <p:nvGrpSpPr>
+        <p:cNvPr id="1" name=""/>
+        <p:cNvGrpSpPr/>
+        <p:nvPr/>
+      </p:nvGrpSpPr>
+      <p:grpSpPr>
+        <a:xfrm>
+          <a:off x="0" y="0"/>
+          <a:ext cx="0" cy="0"/>
+          <a:chOff x="0" y="0"/>
+          <a:chExt cx="0" cy="0"/>
+        </a:xfrm>
+      </p:grpSpPr>
+      <p:grpSp>
+        <p:nvGrpSpPr>
+          <p:cNvPr id="4" name="Gruppieren 3"/>
+          <p:cNvGrpSpPr/>
+          <p:nvPr/>
+        </p:nvGrpSpPr>
+        <p:grpSpPr>
+          <a:xfrm>
+            <a:off x="17631" y="3282696"/>
+            <a:ext cx="12399173" cy="4485524"/>
+            <a:chOff x="17631" y="3282696"/>
+            <a:chExt cx="12399173" cy="4485524"/>
+          </a:xfrm>
+        </p:grpSpPr>
+        <p:pic>
+          <p:nvPicPr>
+            <p:cNvPr id="2" name="Grafik 1"/>
+            <p:cNvPicPr>
+              <a:picLocks noChangeAspect="1"/>
+            </p:cNvPicPr>
+            <p:nvPr/>
+          </p:nvPicPr>
+          <p:blipFill rotWithShape="1">
+            <a:blip r:embed="rId2">
+              <a:extLst>
+                <a:ext uri="{28A0092B-C50C-407E-A947-70E740481C1C}">
+                  <a14:useLocalDpi xmlns:a14="http://schemas.microsoft.com/office/drawing/2010/main" val="0"/>
+                </a:ext>
+              </a:extLst>
+            </a:blip>
+            <a:srcRect t="7778" b="1352"/>
+            <a:stretch/>
+          </p:blipFill>
+          <p:spPr>
+            <a:xfrm>
+              <a:off x="5457814" y="3291042"/>
+              <a:ext cx="6958990" cy="4477177"/>
+            </a:xfrm>
+            <a:prstGeom prst="rect">
+              <a:avLst/>
+            </a:prstGeom>
+          </p:spPr>
+        </p:pic>
+        <p:pic>
+          <p:nvPicPr>
+            <p:cNvPr id="3" name="Grafik 2"/>
+            <p:cNvPicPr>
+              <a:picLocks noChangeAspect="1"/>
+            </p:cNvPicPr>
+            <p:nvPr/>
+          </p:nvPicPr>
+          <p:blipFill rotWithShape="1">
+            <a:blip r:embed="rId3" cstate="print">
+              <a:extLst>
+                <a:ext uri="{28A0092B-C50C-407E-A947-70E740481C1C}">
+                  <a14:useLocalDpi xmlns:a14="http://schemas.microsoft.com/office/drawing/2010/main" val="0"/>
+                </a:ext>
+              </a:extLst>
+            </a:blip>
+            <a:srcRect t="1998" r="13012" b="1"/>
+            <a:stretch/>
+          </p:blipFill>
+          <p:spPr>
+            <a:xfrm>
+              <a:off x="17631" y="3282696"/>
+              <a:ext cx="6053881" cy="4485524"/>
+            </a:xfrm>
+            <a:prstGeom prst="rect">
+              <a:avLst/>
+            </a:prstGeom>
+          </p:spPr>
+        </p:pic>
+      </p:grpSp>
+    </p:spTree>
+    <p:extLst>
+      <p:ext uri="{BB962C8B-B14F-4D97-AF65-F5344CB8AC3E}">
+        <p14:creationId xmlns:p14="http://schemas.microsoft.com/office/powerpoint/2010/main" val="1268957273"/>
+      </p:ext>
+    </p:extLst>
+  </p:cSld>
+  <p:clrMapOvr>
+    <a:masterClrMapping/>
+  </p:clrMapOvr>
+</p:sld>
+</file>
+
 <file path=ppt/theme/theme1.xml><?xml version="1.0" encoding="utf-8"?>
 <a:theme xmlns:a="http://schemas.openxmlformats.org/drawingml/2006/main" name="Office">
   <a:themeElements>

</xml_diff>